<commit_message>
Fixes based on prof comments
</commit_message>
<xml_diff>
--- a/Poster/GW Glitch UW poster.pptx
+++ b/Poster/GW Glitch UW poster.pptx
@@ -294,7 +294,7 @@
           <a:p>
             <a:fld id="{BDFE1444-C34C-AD43-8DDF-A21EF4E7181D}" type="datetimeFigureOut">
               <a:rPr lang="en-US" smtClean="0"/>
-              <a:t>5/27/2023</a:t>
+              <a:t>5/29/2023</a:t>
             </a:fld>
             <a:endParaRPr lang="en-US"/>
           </a:p>
@@ -459,7 +459,7 @@
           <a:p>
             <a:fld id="{BDFE1444-C34C-AD43-8DDF-A21EF4E7181D}" type="datetimeFigureOut">
               <a:rPr lang="en-US" smtClean="0"/>
-              <a:t>5/27/2023</a:t>
+              <a:t>5/29/2023</a:t>
             </a:fld>
             <a:endParaRPr lang="en-US"/>
           </a:p>
@@ -634,7 +634,7 @@
           <a:p>
             <a:fld id="{BDFE1444-C34C-AD43-8DDF-A21EF4E7181D}" type="datetimeFigureOut">
               <a:rPr lang="en-US" smtClean="0"/>
-              <a:t>5/27/2023</a:t>
+              <a:t>5/29/2023</a:t>
             </a:fld>
             <a:endParaRPr lang="en-US"/>
           </a:p>
@@ -799,7 +799,7 @@
           <a:p>
             <a:fld id="{BDFE1444-C34C-AD43-8DDF-A21EF4E7181D}" type="datetimeFigureOut">
               <a:rPr lang="en-US" smtClean="0"/>
-              <a:t>5/27/2023</a:t>
+              <a:t>5/29/2023</a:t>
             </a:fld>
             <a:endParaRPr lang="en-US"/>
           </a:p>
@@ -1038,7 +1038,7 @@
           <a:p>
             <a:fld id="{BDFE1444-C34C-AD43-8DDF-A21EF4E7181D}" type="datetimeFigureOut">
               <a:rPr lang="en-US" smtClean="0"/>
-              <a:t>5/27/2023</a:t>
+              <a:t>5/29/2023</a:t>
             </a:fld>
             <a:endParaRPr lang="en-US"/>
           </a:p>
@@ -1265,7 +1265,7 @@
           <a:p>
             <a:fld id="{BDFE1444-C34C-AD43-8DDF-A21EF4E7181D}" type="datetimeFigureOut">
               <a:rPr lang="en-US" smtClean="0"/>
-              <a:t>5/27/2023</a:t>
+              <a:t>5/29/2023</a:t>
             </a:fld>
             <a:endParaRPr lang="en-US"/>
           </a:p>
@@ -1627,7 +1627,7 @@
           <a:p>
             <a:fld id="{BDFE1444-C34C-AD43-8DDF-A21EF4E7181D}" type="datetimeFigureOut">
               <a:rPr lang="en-US" smtClean="0"/>
-              <a:t>5/27/2023</a:t>
+              <a:t>5/29/2023</a:t>
             </a:fld>
             <a:endParaRPr lang="en-US"/>
           </a:p>
@@ -1740,7 +1740,7 @@
           <a:p>
             <a:fld id="{BDFE1444-C34C-AD43-8DDF-A21EF4E7181D}" type="datetimeFigureOut">
               <a:rPr lang="en-US" smtClean="0"/>
-              <a:t>5/27/2023</a:t>
+              <a:t>5/29/2023</a:t>
             </a:fld>
             <a:endParaRPr lang="en-US"/>
           </a:p>
@@ -1830,7 +1830,7 @@
           <a:p>
             <a:fld id="{BDFE1444-C34C-AD43-8DDF-A21EF4E7181D}" type="datetimeFigureOut">
               <a:rPr lang="en-US" smtClean="0"/>
-              <a:t>5/27/2023</a:t>
+              <a:t>5/29/2023</a:t>
             </a:fld>
             <a:endParaRPr lang="en-US"/>
           </a:p>
@@ -2102,7 +2102,7 @@
           <a:p>
             <a:fld id="{BDFE1444-C34C-AD43-8DDF-A21EF4E7181D}" type="datetimeFigureOut">
               <a:rPr lang="en-US" smtClean="0"/>
-              <a:t>5/27/2023</a:t>
+              <a:t>5/29/2023</a:t>
             </a:fld>
             <a:endParaRPr lang="en-US"/>
           </a:p>
@@ -2354,7 +2354,7 @@
           <a:p>
             <a:fld id="{BDFE1444-C34C-AD43-8DDF-A21EF4E7181D}" type="datetimeFigureOut">
               <a:rPr lang="en-US" smtClean="0"/>
-              <a:t>5/27/2023</a:t>
+              <a:t>5/29/2023</a:t>
             </a:fld>
             <a:endParaRPr lang="en-US"/>
           </a:p>
@@ -2562,7 +2562,7 @@
           <a:p>
             <a:fld id="{BDFE1444-C34C-AD43-8DDF-A21EF4E7181D}" type="datetimeFigureOut">
               <a:rPr lang="en-US" smtClean="0"/>
-              <a:t>5/27/2023</a:t>
+              <a:t>5/29/2023</a:t>
             </a:fld>
             <a:endParaRPr lang="en-US"/>
           </a:p>
@@ -3011,7 +3011,7 @@
           <a:lstStyle/>
           <a:p>
             <a:pPr algn="ctr"/>
-            <a:endParaRPr lang="en-US"/>
+            <a:endParaRPr lang="en-US" sz="4800"/>
           </a:p>
         </p:txBody>
       </p:sp>
@@ -3037,7 +3037,7 @@
         </p:blipFill>
         <p:spPr>
           <a:xfrm>
-            <a:off x="1371600" y="4669030"/>
+            <a:off x="1371600" y="4663440"/>
             <a:ext cx="5029200" cy="950976"/>
           </a:xfrm>
           <a:prstGeom prst="rect">
@@ -3091,7 +3091,7 @@
         <p:spPr>
           <a:xfrm>
             <a:off x="13350240" y="731520"/>
-            <a:ext cx="7315200" cy="1384995"/>
+            <a:ext cx="7315200" cy="914400"/>
           </a:xfrm>
           <a:prstGeom prst="rect">
             <a:avLst/>
@@ -3196,8 +3196,8 @@
         </p:nvCxnSpPr>
         <p:spPr>
           <a:xfrm>
-            <a:off x="7608277" y="7461504"/>
-            <a:ext cx="0" cy="24085296"/>
+            <a:off x="7315200" y="7315200"/>
+            <a:ext cx="0" cy="24231600"/>
           </a:xfrm>
           <a:prstGeom prst="line">
             <a:avLst/>
@@ -3231,8 +3231,8 @@
         </p:nvCxnSpPr>
         <p:spPr>
           <a:xfrm>
-            <a:off x="14342876" y="7498080"/>
-            <a:ext cx="0" cy="24048720"/>
+            <a:off x="14630400" y="7315200"/>
+            <a:ext cx="0" cy="24231600"/>
           </a:xfrm>
           <a:prstGeom prst="line">
             <a:avLst/>
@@ -3266,10 +3266,10 @@
         </p:nvGrpSpPr>
         <p:grpSpPr>
           <a:xfrm>
-            <a:off x="14721840" y="7315200"/>
-            <a:ext cx="5753101" cy="935736"/>
-            <a:chOff x="1293828" y="15466797"/>
-            <a:chExt cx="5753101" cy="935736"/>
+            <a:off x="15087599" y="7315200"/>
+            <a:ext cx="6400800" cy="940896"/>
+            <a:chOff x="1659587" y="15466797"/>
+            <a:chExt cx="6400800" cy="940896"/>
           </a:xfrm>
         </p:grpSpPr>
         <p:sp>
@@ -3280,8 +3280,8 @@
           </p:nvSpPr>
           <p:spPr>
             <a:xfrm>
-              <a:off x="1293828" y="15466797"/>
-              <a:ext cx="5753101" cy="707886"/>
+              <a:off x="1659587" y="15466797"/>
+              <a:ext cx="6400800" cy="707886"/>
             </a:xfrm>
             <a:prstGeom prst="rect">
               <a:avLst/>
@@ -3327,8 +3327,8 @@
           </p:blipFill>
           <p:spPr>
             <a:xfrm>
-              <a:off x="1385268" y="16289757"/>
-              <a:ext cx="1399032" cy="112776"/>
+              <a:off x="1751028" y="16289757"/>
+              <a:ext cx="1463040" cy="117936"/>
             </a:xfrm>
             <a:prstGeom prst="rect">
               <a:avLst/>
@@ -3344,8 +3344,8 @@
         </p:nvSpPr>
         <p:spPr>
           <a:xfrm>
-            <a:off x="14799612" y="8503920"/>
-            <a:ext cx="6400800" cy="5355312"/>
+            <a:off x="15087600" y="8412480"/>
+            <a:ext cx="6400800" cy="5029200"/>
           </a:xfrm>
           <a:prstGeom prst="rect">
             <a:avLst/>
@@ -3358,6 +3358,22 @@
           </a:bodyPr>
           <a:lstStyle/>
           <a:p>
+            <a:pPr marL="285750" indent="-285750">
+              <a:buFont typeface="Arial" panose="020B0604020202020204" pitchFamily="34" charset="0"/>
+              <a:buChar char="•"/>
+            </a:pPr>
+            <a:r>
+              <a:rPr lang="en-US" sz="1800" b="1" i="0" u="none" strike="noStrike" dirty="0">
+                <a:solidFill>
+                  <a:srgbClr val="33006F"/>
+                </a:solidFill>
+                <a:effectLst/>
+                <a:latin typeface="Open Sans" panose="020B0606030504020204" pitchFamily="34" charset="0"/>
+                <a:ea typeface="Open Sans" panose="020B0606030504020204" pitchFamily="34" charset="0"/>
+                <a:cs typeface="Open Sans" panose="020B0606030504020204" pitchFamily="34" charset="0"/>
+              </a:rPr>
+              <a:t>Model performance: </a:t>
+            </a:r>
             <a:r>
               <a:rPr lang="en-US" sz="1800" b="0" i="0" u="none" strike="noStrike" dirty="0">
                 <a:solidFill>
@@ -3368,7 +3384,115 @@
                 <a:ea typeface="Open Sans" panose="020B0606030504020204" pitchFamily="34" charset="0"/>
                 <a:cs typeface="Open Sans" panose="020B0606030504020204" pitchFamily="34" charset="0"/>
               </a:rPr>
-              <a:t>Observing our training loss and validation accuracy plot, we can infer that our model is learning the dataset well.  After a total of 16 epochs and more than 2400 iterations, our training loss is about 0.1 while our validation accuracy is near 96%.  Overall, our CNN model’s testing accuracy obtains a respectable target of 97%, nearly achieving the same accuracy seen in similar CNN architectures in the literature.  Some examples of these are (Fernandes et al., 2018) and (George D.  et al., 2023), who achieve 99% and 98.8% accuracy, respectively.  However, it should be noted that our dataset comprised entirely separate time series for gravitational wave signal data and noise data, while the authors of these works had to employ more complex methods to filter the noise out from their data.  For instance, while </a:t>
+              <a:t>Training loss of about 0.1 and validation accuracy near 96% after 16 epochs and over 2400 iterations.</a:t>
+            </a:r>
+          </a:p>
+          <a:p>
+            <a:pPr marL="285750" indent="-285750">
+              <a:buFont typeface="Arial" panose="020B0604020202020204" pitchFamily="34" charset="0"/>
+              <a:buChar char="•"/>
+            </a:pPr>
+            <a:r>
+              <a:rPr lang="en-US" sz="1800" b="1" i="0" u="none" strike="noStrike" dirty="0">
+                <a:solidFill>
+                  <a:srgbClr val="33006F"/>
+                </a:solidFill>
+                <a:effectLst/>
+                <a:latin typeface="Open Sans" panose="020B0606030504020204" pitchFamily="34" charset="0"/>
+                <a:ea typeface="Open Sans" panose="020B0606030504020204" pitchFamily="34" charset="0"/>
+                <a:cs typeface="Open Sans" panose="020B0606030504020204" pitchFamily="34" charset="0"/>
+              </a:rPr>
+              <a:t>Testing accuracy: </a:t>
+            </a:r>
+            <a:r>
+              <a:rPr lang="en-US" sz="1800" b="0" i="0" u="none" strike="noStrike" dirty="0">
+                <a:solidFill>
+                  <a:srgbClr val="000000"/>
+                </a:solidFill>
+                <a:effectLst/>
+                <a:latin typeface="Open Sans" panose="020B0606030504020204" pitchFamily="34" charset="0"/>
+                <a:ea typeface="Open Sans" panose="020B0606030504020204" pitchFamily="34" charset="0"/>
+                <a:cs typeface="Open Sans" panose="020B0606030504020204" pitchFamily="34" charset="0"/>
+              </a:rPr>
+              <a:t>CNN model achieved a respectable accuracy of 97% on the testing dataset.</a:t>
+            </a:r>
+          </a:p>
+          <a:p>
+            <a:pPr marL="285750" indent="-285750">
+              <a:buFont typeface="Arial" panose="020B0604020202020204" pitchFamily="34" charset="0"/>
+              <a:buChar char="•"/>
+            </a:pPr>
+            <a:r>
+              <a:rPr lang="en-US" sz="1800" b="1" i="0" u="none" strike="noStrike" dirty="0">
+                <a:solidFill>
+                  <a:srgbClr val="33006F"/>
+                </a:solidFill>
+                <a:effectLst/>
+                <a:latin typeface="Open Sans" panose="020B0606030504020204" pitchFamily="34" charset="0"/>
+                <a:ea typeface="Open Sans" panose="020B0606030504020204" pitchFamily="34" charset="0"/>
+                <a:cs typeface="Open Sans" panose="020B0606030504020204" pitchFamily="34" charset="0"/>
+              </a:rPr>
+              <a:t>Comparison with literature: </a:t>
+            </a:r>
+            <a:r>
+              <a:rPr lang="en-US" sz="1800" b="0" i="0" u="none" strike="noStrike" dirty="0">
+                <a:solidFill>
+                  <a:srgbClr val="000000"/>
+                </a:solidFill>
+                <a:effectLst/>
+                <a:latin typeface="Open Sans" panose="020B0606030504020204" pitchFamily="34" charset="0"/>
+                <a:ea typeface="Open Sans" panose="020B0606030504020204" pitchFamily="34" charset="0"/>
+                <a:cs typeface="Open Sans" panose="020B0606030504020204" pitchFamily="34" charset="0"/>
+              </a:rPr>
+              <a:t>Similar CNN architectures in the literature achieved higher accuracies, such as 99% (Fernandes et al., 2018) and 98.8% (George D. et al., 2023).</a:t>
+            </a:r>
+          </a:p>
+          <a:p>
+            <a:pPr marL="285750" indent="-285750">
+              <a:buFont typeface="Arial" panose="020B0604020202020204" pitchFamily="34" charset="0"/>
+              <a:buChar char="•"/>
+            </a:pPr>
+            <a:r>
+              <a:rPr lang="en-US" sz="1800" b="1" i="0" u="none" strike="noStrike" dirty="0">
+                <a:solidFill>
+                  <a:srgbClr val="33006F"/>
+                </a:solidFill>
+                <a:effectLst/>
+                <a:latin typeface="Open Sans" panose="020B0606030504020204" pitchFamily="34" charset="0"/>
+                <a:ea typeface="Open Sans" panose="020B0606030504020204" pitchFamily="34" charset="0"/>
+                <a:cs typeface="Open Sans" panose="020B0606030504020204" pitchFamily="34" charset="0"/>
+              </a:rPr>
+              <a:t>Dataset differences: </a:t>
+            </a:r>
+            <a:r>
+              <a:rPr lang="en-US" sz="1800" b="0" i="0" u="none" strike="noStrike" dirty="0">
+                <a:solidFill>
+                  <a:srgbClr val="000000"/>
+                </a:solidFill>
+                <a:effectLst/>
+                <a:latin typeface="Open Sans" panose="020B0606030504020204" pitchFamily="34" charset="0"/>
+                <a:ea typeface="Open Sans" panose="020B0606030504020204" pitchFamily="34" charset="0"/>
+                <a:cs typeface="Open Sans" panose="020B0606030504020204" pitchFamily="34" charset="0"/>
+              </a:rPr>
+              <a:t>Our dataset consisted of separate time series for gravitational wave signal data and noise data, while other works had to apply more complex noise filtering methods.</a:t>
+            </a:r>
+          </a:p>
+          <a:p>
+            <a:pPr marL="285750" indent="-285750">
+              <a:buFont typeface="Arial" panose="020B0604020202020204" pitchFamily="34" charset="0"/>
+              <a:buChar char="•"/>
+            </a:pPr>
+            <a:r>
+              <a:rPr lang="en-US" sz="1800" b="1" i="0" u="none" strike="noStrike" dirty="0">
+                <a:solidFill>
+                  <a:srgbClr val="33006F"/>
+                </a:solidFill>
+                <a:effectLst/>
+                <a:latin typeface="Open Sans" panose="020B0606030504020204" pitchFamily="34" charset="0"/>
+                <a:ea typeface="Open Sans" panose="020B0606030504020204" pitchFamily="34" charset="0"/>
+                <a:cs typeface="Open Sans" panose="020B0606030504020204" pitchFamily="34" charset="0"/>
+              </a:rPr>
+              <a:t>Image conversion: </a:t>
             </a:r>
             <a:r>
               <a:rPr lang="en-US" sz="1800" b="0" i="0" u="none" strike="noStrike" dirty="0" err="1">
@@ -3392,13 +3516,8 @@
                 <a:ea typeface="Open Sans" panose="020B0606030504020204" pitchFamily="34" charset="0"/>
                 <a:cs typeface="Open Sans" panose="020B0606030504020204" pitchFamily="34" charset="0"/>
               </a:rPr>
-              <a:t> Angular Fields were quite effective at image conversion, others found Fourier transforms better suited to the task of handling complex noise and background by filtering in the frequency domain.</a:t>
-            </a:r>
-            <a:endParaRPr lang="en-US" sz="1800" dirty="0">
-              <a:latin typeface="Open Sans" panose="020B0606030504020204" pitchFamily="34" charset="0"/>
-              <a:ea typeface="Open Sans" panose="020B0606030504020204" pitchFamily="34" charset="0"/>
-              <a:cs typeface="Open Sans" panose="020B0606030504020204" pitchFamily="34" charset="0"/>
-            </a:endParaRPr>
+              <a:t> Angular Fields were effective for image conversion in our case, while others found Fourier transforms more suitable for handling complex noise and background through frequency domain filtering.</a:t>
+            </a:r>
           </a:p>
         </p:txBody>
       </p:sp>
@@ -3410,10 +3529,10 @@
         </p:nvGrpSpPr>
         <p:grpSpPr>
           <a:xfrm>
-            <a:off x="14721840" y="27249120"/>
-            <a:ext cx="5753101" cy="935736"/>
-            <a:chOff x="1309926" y="15504462"/>
-            <a:chExt cx="5753101" cy="935736"/>
+            <a:off x="15087599" y="27249120"/>
+            <a:ext cx="6400800" cy="940896"/>
+            <a:chOff x="1675685" y="15504462"/>
+            <a:chExt cx="6400800" cy="940896"/>
           </a:xfrm>
         </p:grpSpPr>
         <p:sp>
@@ -3424,8 +3543,8 @@
           </p:nvSpPr>
           <p:spPr>
             <a:xfrm>
-              <a:off x="1309926" y="15504462"/>
-              <a:ext cx="5753101" cy="707886"/>
+              <a:off x="1675685" y="15504462"/>
+              <a:ext cx="6400800" cy="707886"/>
             </a:xfrm>
             <a:prstGeom prst="rect">
               <a:avLst/>
@@ -3471,8 +3590,8 @@
           </p:blipFill>
           <p:spPr>
             <a:xfrm>
-              <a:off x="1464947" y="16327422"/>
-              <a:ext cx="1399032" cy="112776"/>
+              <a:off x="1767126" y="16327422"/>
+              <a:ext cx="1463040" cy="117936"/>
             </a:xfrm>
             <a:prstGeom prst="rect">
               <a:avLst/>
@@ -3488,8 +3607,8 @@
         </p:nvSpPr>
         <p:spPr>
           <a:xfrm>
-            <a:off x="14834313" y="28437840"/>
-            <a:ext cx="6400800" cy="3416320"/>
+            <a:off x="15087600" y="28437840"/>
+            <a:ext cx="6400800" cy="3970318"/>
           </a:xfrm>
           <a:prstGeom prst="rect">
             <a:avLst/>
@@ -3502,6 +3621,22 @@
           </a:bodyPr>
           <a:lstStyle/>
           <a:p>
+            <a:pPr marL="285750" indent="-285750">
+              <a:buFont typeface="Arial" panose="020B0604020202020204" pitchFamily="34" charset="0"/>
+              <a:buChar char="•"/>
+            </a:pPr>
+            <a:r>
+              <a:rPr lang="en-US" sz="1800" b="1" i="0" u="none" strike="noStrike" dirty="0">
+                <a:solidFill>
+                  <a:srgbClr val="33006F"/>
+                </a:solidFill>
+                <a:effectLst/>
+                <a:latin typeface="Open Sans" panose="020B0606030504020204" pitchFamily="34" charset="0"/>
+                <a:ea typeface="Open Sans" panose="020B0606030504020204" pitchFamily="34" charset="0"/>
+                <a:cs typeface="Open Sans" panose="020B0606030504020204" pitchFamily="34" charset="0"/>
+              </a:rPr>
+              <a:t>Objective: </a:t>
+            </a:r>
             <a:r>
               <a:rPr lang="en-US" sz="1800" b="0" i="0" u="none" strike="noStrike" dirty="0">
                 <a:solidFill>
@@ -3512,7 +3647,127 @@
                 <a:ea typeface="Open Sans" panose="020B0606030504020204" pitchFamily="34" charset="0"/>
                 <a:cs typeface="Open Sans" panose="020B0606030504020204" pitchFamily="34" charset="0"/>
               </a:rPr>
-              <a:t>In this work we analyze the potential of convolutional neural networks (CNNs) to help classify gravitational waves strain data as background noise/glitches or transient sine-gaussian/binary mergers.  Employing a simplified version of the most common approaches in the literature, we were able to surpass our expectations by achieving an accuracy above 95% and only slightly below the more complex CNNs used for comparison.  A question to be further explored could be to see how well the </a:t>
+              <a:t>Analyzing the potential of CNNs for classifying gravitational waves strain data as background noise/glitches or transient sine-gaussian/binary mergers.</a:t>
+            </a:r>
+          </a:p>
+          <a:p>
+            <a:pPr marL="285750" indent="-285750">
+              <a:buFont typeface="Arial" panose="020B0604020202020204" pitchFamily="34" charset="0"/>
+              <a:buChar char="•"/>
+            </a:pPr>
+            <a:r>
+              <a:rPr lang="en-US" sz="1800" b="1" i="0" u="none" strike="noStrike" dirty="0">
+                <a:solidFill>
+                  <a:srgbClr val="33006F"/>
+                </a:solidFill>
+                <a:effectLst/>
+                <a:latin typeface="Open Sans" panose="020B0606030504020204" pitchFamily="34" charset="0"/>
+                <a:ea typeface="Open Sans" panose="020B0606030504020204" pitchFamily="34" charset="0"/>
+                <a:cs typeface="Open Sans" panose="020B0606030504020204" pitchFamily="34" charset="0"/>
+              </a:rPr>
+              <a:t>Approach: </a:t>
+            </a:r>
+            <a:r>
+              <a:rPr lang="en-US" sz="1800" b="0" i="0" u="none" strike="noStrike" dirty="0">
+                <a:solidFill>
+                  <a:srgbClr val="000000"/>
+                </a:solidFill>
+                <a:effectLst/>
+                <a:latin typeface="Open Sans" panose="020B0606030504020204" pitchFamily="34" charset="0"/>
+                <a:ea typeface="Open Sans" panose="020B0606030504020204" pitchFamily="34" charset="0"/>
+                <a:cs typeface="Open Sans" panose="020B0606030504020204" pitchFamily="34" charset="0"/>
+              </a:rPr>
+              <a:t>Utilized a simplified version of common approaches in the literature.</a:t>
+            </a:r>
+          </a:p>
+          <a:p>
+            <a:pPr marL="285750" indent="-285750">
+              <a:buFont typeface="Arial" panose="020B0604020202020204" pitchFamily="34" charset="0"/>
+              <a:buChar char="•"/>
+            </a:pPr>
+            <a:r>
+              <a:rPr lang="en-US" sz="1800" b="1" i="0" u="none" strike="noStrike" dirty="0">
+                <a:solidFill>
+                  <a:srgbClr val="33006F"/>
+                </a:solidFill>
+                <a:effectLst/>
+                <a:latin typeface="Open Sans" panose="020B0606030504020204" pitchFamily="34" charset="0"/>
+                <a:ea typeface="Open Sans" panose="020B0606030504020204" pitchFamily="34" charset="0"/>
+                <a:cs typeface="Open Sans" panose="020B0606030504020204" pitchFamily="34" charset="0"/>
+              </a:rPr>
+              <a:t>Performance: </a:t>
+            </a:r>
+            <a:r>
+              <a:rPr lang="en-US" sz="1800" b="0" i="0" u="none" strike="noStrike" dirty="0">
+                <a:solidFill>
+                  <a:srgbClr val="000000"/>
+                </a:solidFill>
+                <a:effectLst/>
+                <a:latin typeface="Open Sans" panose="020B0606030504020204" pitchFamily="34" charset="0"/>
+                <a:ea typeface="Open Sans" panose="020B0606030504020204" pitchFamily="34" charset="0"/>
+                <a:cs typeface="Open Sans" panose="020B0606030504020204" pitchFamily="34" charset="0"/>
+              </a:rPr>
+              <a:t>Surpassed expectations by achieving an accuracy of 97%.</a:t>
+            </a:r>
+          </a:p>
+          <a:p>
+            <a:pPr marL="285750" indent="-285750">
+              <a:buFont typeface="Arial" panose="020B0604020202020204" pitchFamily="34" charset="0"/>
+              <a:buChar char="•"/>
+            </a:pPr>
+            <a:r>
+              <a:rPr lang="en-US" sz="1800" b="1" i="0" u="none" strike="noStrike" dirty="0">
+                <a:solidFill>
+                  <a:srgbClr val="33006F"/>
+                </a:solidFill>
+                <a:effectLst/>
+                <a:latin typeface="Open Sans" panose="020B0606030504020204" pitchFamily="34" charset="0"/>
+                <a:ea typeface="Open Sans" panose="020B0606030504020204" pitchFamily="34" charset="0"/>
+                <a:cs typeface="Open Sans" panose="020B0606030504020204" pitchFamily="34" charset="0"/>
+              </a:rPr>
+              <a:t>Comparison: </a:t>
+            </a:r>
+            <a:r>
+              <a:rPr lang="en-US" sz="1800" b="0" i="0" u="none" strike="noStrike" dirty="0">
+                <a:solidFill>
+                  <a:srgbClr val="000000"/>
+                </a:solidFill>
+                <a:effectLst/>
+                <a:latin typeface="Open Sans" panose="020B0606030504020204" pitchFamily="34" charset="0"/>
+                <a:ea typeface="Open Sans" panose="020B0606030504020204" pitchFamily="34" charset="0"/>
+                <a:cs typeface="Open Sans" panose="020B0606030504020204" pitchFamily="34" charset="0"/>
+              </a:rPr>
+              <a:t>Achieved accuracy slightly below more complex CNNs used for comparison.</a:t>
+            </a:r>
+          </a:p>
+          <a:p>
+            <a:pPr marL="285750" indent="-285750">
+              <a:buFont typeface="Arial" panose="020B0604020202020204" pitchFamily="34" charset="0"/>
+              <a:buChar char="•"/>
+            </a:pPr>
+            <a:r>
+              <a:rPr lang="en-US" sz="1800" b="1" i="0" u="none" strike="noStrike" dirty="0">
+                <a:solidFill>
+                  <a:srgbClr val="33006F"/>
+                </a:solidFill>
+                <a:effectLst/>
+                <a:latin typeface="Open Sans" panose="020B0606030504020204" pitchFamily="34" charset="0"/>
+                <a:ea typeface="Open Sans" panose="020B0606030504020204" pitchFamily="34" charset="0"/>
+                <a:cs typeface="Open Sans" panose="020B0606030504020204" pitchFamily="34" charset="0"/>
+              </a:rPr>
+              <a:t>Further exploration: </a:t>
+            </a:r>
+            <a:r>
+              <a:rPr lang="en-US" sz="1800" b="0" i="0" u="none" strike="noStrike" dirty="0">
+                <a:solidFill>
+                  <a:srgbClr val="000000"/>
+                </a:solidFill>
+                <a:effectLst/>
+                <a:latin typeface="Open Sans" panose="020B0606030504020204" pitchFamily="34" charset="0"/>
+                <a:ea typeface="Open Sans" panose="020B0606030504020204" pitchFamily="34" charset="0"/>
+                <a:cs typeface="Open Sans" panose="020B0606030504020204" pitchFamily="34" charset="0"/>
+              </a:rPr>
+              <a:t>Investigating the effectiveness of the </a:t>
             </a:r>
             <a:r>
               <a:rPr lang="en-US" sz="1800" b="0" i="0" u="none" strike="noStrike" dirty="0" err="1">
@@ -3536,16 +3791,8 @@
                 <a:ea typeface="Open Sans" panose="020B0606030504020204" pitchFamily="34" charset="0"/>
                 <a:cs typeface="Open Sans" panose="020B0606030504020204" pitchFamily="34" charset="0"/>
               </a:rPr>
-              <a:t> Angular Field approach to converting time series to images and passing them through a simple CNN would translate to more realistic data.</a:t>
-            </a:r>
-            <a:endParaRPr lang="en-US" sz="1800" dirty="0">
-              <a:solidFill>
-                <a:srgbClr val="000000"/>
-              </a:solidFill>
-              <a:latin typeface="Open Sans" panose="020B0606030504020204" pitchFamily="34" charset="0"/>
-              <a:ea typeface="Open Sans" panose="020B0606030504020204" pitchFamily="34" charset="0"/>
-              <a:cs typeface="Open Sans" panose="020B0606030504020204" pitchFamily="34" charset="0"/>
-            </a:endParaRPr>
+              <a:t> Angular Field approach for converting time series to images and passing them through a simple CNN on more realistic data.</a:t>
+            </a:r>
           </a:p>
         </p:txBody>
       </p:sp>
@@ -3591,8 +3838,8 @@
         </p:nvSpPr>
         <p:spPr>
           <a:xfrm>
-            <a:off x="8049280" y="7461504"/>
-            <a:ext cx="5810019" cy="8205670"/>
+            <a:off x="7772400" y="7315200"/>
+            <a:ext cx="6400800" cy="7223760"/>
           </a:xfrm>
           <a:prstGeom prst="rect">
             <a:avLst/>
@@ -3631,8 +3878,8 @@
         </p:nvSpPr>
         <p:spPr>
           <a:xfrm>
-            <a:off x="8509815" y="7589520"/>
-            <a:ext cx="4888947" cy="8046720"/>
+            <a:off x="7955280" y="7406640"/>
+            <a:ext cx="6035040" cy="7048083"/>
           </a:xfrm>
           <a:prstGeom prst="rect">
             <a:avLst/>
@@ -3699,7 +3946,7 @@
                 <a:ea typeface="Open Sans" panose="020B0606030504020204" pitchFamily="34" charset="0"/>
                 <a:cs typeface="Open Sans" panose="020B0606030504020204" pitchFamily="34" charset="0"/>
               </a:rPr>
-              <a:t>~97% </a:t>
+              <a:t>~ 97% </a:t>
             </a:r>
             <a:r>
               <a:rPr lang="en-US" sz="2200" dirty="0">
@@ -4200,10 +4447,10 @@
         </p:nvGrpSpPr>
         <p:grpSpPr>
           <a:xfrm>
-            <a:off x="8138160" y="15910560"/>
-            <a:ext cx="5753101" cy="935736"/>
-            <a:chOff x="1395584" y="15409801"/>
-            <a:chExt cx="5753101" cy="935736"/>
+            <a:off x="7772399" y="14813280"/>
+            <a:ext cx="6400800" cy="940896"/>
+            <a:chOff x="1029823" y="14312521"/>
+            <a:chExt cx="6400800" cy="940896"/>
           </a:xfrm>
         </p:grpSpPr>
         <p:sp>
@@ -4214,8 +4461,8 @@
           </p:nvSpPr>
           <p:spPr>
             <a:xfrm>
-              <a:off x="1395584" y="15409801"/>
-              <a:ext cx="5753101" cy="707886"/>
+              <a:off x="1029823" y="14312521"/>
+              <a:ext cx="6400800" cy="707886"/>
             </a:xfrm>
             <a:prstGeom prst="rect">
               <a:avLst/>
@@ -4261,8 +4508,8 @@
           </p:blipFill>
           <p:spPr>
             <a:xfrm>
-              <a:off x="1487024" y="16232761"/>
-              <a:ext cx="1399032" cy="112776"/>
+              <a:off x="1121264" y="15135481"/>
+              <a:ext cx="1463040" cy="117936"/>
             </a:xfrm>
             <a:prstGeom prst="rect">
               <a:avLst/>
@@ -4278,8 +4525,8 @@
         </p:nvSpPr>
         <p:spPr>
           <a:xfrm>
-            <a:off x="8114176" y="17007840"/>
-            <a:ext cx="5753101" cy="7294305"/>
+            <a:off x="7772400" y="15910560"/>
+            <a:ext cx="6400800" cy="4801314"/>
           </a:xfrm>
           <a:prstGeom prst="rect">
             <a:avLst/>
@@ -4292,6 +4539,22 @@
           </a:bodyPr>
           <a:lstStyle/>
           <a:p>
+            <a:pPr marL="285750" indent="-285750">
+              <a:buFont typeface="Arial" panose="020B0604020202020204" pitchFamily="34" charset="0"/>
+              <a:buChar char="•"/>
+            </a:pPr>
+            <a:r>
+              <a:rPr lang="en-US" sz="1800" b="1" i="0" u="none" strike="noStrike" dirty="0">
+                <a:solidFill>
+                  <a:srgbClr val="33006F"/>
+                </a:solidFill>
+                <a:effectLst/>
+                <a:latin typeface="Open Sans" panose="020B0606030504020204" pitchFamily="34" charset="0"/>
+                <a:ea typeface="Open Sans" panose="020B0606030504020204" pitchFamily="34" charset="0"/>
+                <a:cs typeface="Open Sans" panose="020B0606030504020204" pitchFamily="34" charset="0"/>
+              </a:rPr>
+              <a:t>Scaling: </a:t>
+            </a:r>
             <a:r>
               <a:rPr lang="en-US" sz="1800" b="0" i="0" u="none" strike="noStrike" dirty="0">
                 <a:solidFill>
@@ -4302,7 +4565,7 @@
                 <a:ea typeface="Open Sans" panose="020B0606030504020204" pitchFamily="34" charset="0"/>
                 <a:cs typeface="Open Sans" panose="020B0606030504020204" pitchFamily="34" charset="0"/>
               </a:rPr>
-              <a:t>The data that we used was obtained from the LIGO observatories at both Hanford, WA and Livingston, LA.  To analyze this dataset properly, we confirmed that it was scaled properly by utilizing the </a:t>
+              <a:t>Utilized the </a:t>
             </a:r>
             <a:r>
               <a:rPr lang="en-US" sz="1800" b="0" i="0" u="none" strike="noStrike" dirty="0" err="1">
@@ -4326,16 +4589,158 @@
                 <a:ea typeface="Open Sans" panose="020B0606030504020204" pitchFamily="34" charset="0"/>
                 <a:cs typeface="Open Sans" panose="020B0606030504020204" pitchFamily="34" charset="0"/>
               </a:rPr>
-              <a:t> class which ensured that our data had a mean of 0 and a standard deviation of 1.  From this we converted our normalized strain data into GAF images for insertion into a deep CNN for binary classification.  The output of the model gave us a probability prediction of the images for either background or signal which we then compared to our ground truth targets.  The trained model was then tested against our testing data set and achieved an overall accuracy of 97%.  From the plots of our correctly and incorrectly identified signals, it appears that our model incorrectly classifies the images when the two detectors have disagreeing data.  For instance, in our last incorrectly classified signal, the Hanford detector appears to be noise while the Livingston detector is observing a signal.  However, our model classifies both as noise, seeming to become confused when the two detectors receive contradictory signals.  This could also be a flaw arising from the observatories, where one may be capturing signals while the other is solely identifying noise.</a:t>
-            </a:r>
-            <a:endParaRPr lang="en-US" sz="1800" dirty="0">
-              <a:solidFill>
-                <a:srgbClr val="000000"/>
-              </a:solidFill>
-              <a:latin typeface="Open Sans" panose="020B0606030504020204" pitchFamily="34" charset="0"/>
-              <a:ea typeface="Open Sans" panose="020B0606030504020204" pitchFamily="34" charset="0"/>
-              <a:cs typeface="Open Sans" panose="020B0606030504020204" pitchFamily="34" charset="0"/>
-            </a:endParaRPr>
+              <a:t> function to ensure data was normalized before conversion to GAF images.</a:t>
+            </a:r>
+          </a:p>
+          <a:p>
+            <a:pPr marL="285750" indent="-285750">
+              <a:buFont typeface="Arial" panose="020B0604020202020204" pitchFamily="34" charset="0"/>
+              <a:buChar char="•"/>
+            </a:pPr>
+            <a:r>
+              <a:rPr lang="en-US" sz="1800" b="1" i="0" u="none" strike="noStrike" dirty="0">
+                <a:solidFill>
+                  <a:srgbClr val="33006F"/>
+                </a:solidFill>
+                <a:effectLst/>
+                <a:latin typeface="Open Sans" panose="020B0606030504020204" pitchFamily="34" charset="0"/>
+                <a:ea typeface="Open Sans" panose="020B0606030504020204" pitchFamily="34" charset="0"/>
+                <a:cs typeface="Open Sans" panose="020B0606030504020204" pitchFamily="34" charset="0"/>
+              </a:rPr>
+              <a:t>Model output: </a:t>
+            </a:r>
+            <a:r>
+              <a:rPr lang="en-US" sz="1800" b="0" i="0" u="none" strike="noStrike" dirty="0">
+                <a:solidFill>
+                  <a:srgbClr val="000000"/>
+                </a:solidFill>
+                <a:effectLst/>
+                <a:latin typeface="Open Sans" panose="020B0606030504020204" pitchFamily="34" charset="0"/>
+                <a:ea typeface="Open Sans" panose="020B0606030504020204" pitchFamily="34" charset="0"/>
+                <a:cs typeface="Open Sans" panose="020B0606030504020204" pitchFamily="34" charset="0"/>
+              </a:rPr>
+              <a:t>Probability predictions of images for background or signal compared to ground truth targets.</a:t>
+            </a:r>
+          </a:p>
+          <a:p>
+            <a:pPr marL="285750" indent="-285750">
+              <a:buFont typeface="Arial" panose="020B0604020202020204" pitchFamily="34" charset="0"/>
+              <a:buChar char="•"/>
+            </a:pPr>
+            <a:r>
+              <a:rPr lang="en-US" sz="1800" b="1" i="0" u="none" strike="noStrike" dirty="0">
+                <a:solidFill>
+                  <a:srgbClr val="33006F"/>
+                </a:solidFill>
+                <a:effectLst/>
+                <a:latin typeface="Open Sans" panose="020B0606030504020204" pitchFamily="34" charset="0"/>
+                <a:ea typeface="Open Sans" panose="020B0606030504020204" pitchFamily="34" charset="0"/>
+                <a:cs typeface="Open Sans" panose="020B0606030504020204" pitchFamily="34" charset="0"/>
+              </a:rPr>
+              <a:t>Testing and accuracy: </a:t>
+            </a:r>
+            <a:r>
+              <a:rPr lang="en-US" sz="1800" b="0" i="0" u="none" strike="noStrike" dirty="0">
+                <a:solidFill>
+                  <a:srgbClr val="000000"/>
+                </a:solidFill>
+                <a:effectLst/>
+                <a:latin typeface="Open Sans" panose="020B0606030504020204" pitchFamily="34" charset="0"/>
+                <a:ea typeface="Open Sans" panose="020B0606030504020204" pitchFamily="34" charset="0"/>
+                <a:cs typeface="Open Sans" panose="020B0606030504020204" pitchFamily="34" charset="0"/>
+              </a:rPr>
+              <a:t>Tested trained model against a separate testing dataset, achieved an overall accuracy of 97%.</a:t>
+            </a:r>
+          </a:p>
+          <a:p>
+            <a:pPr marL="285750" indent="-285750">
+              <a:buFont typeface="Arial" panose="020B0604020202020204" pitchFamily="34" charset="0"/>
+              <a:buChar char="•"/>
+            </a:pPr>
+            <a:r>
+              <a:rPr lang="en-US" sz="1800" b="1" i="0" u="none" strike="noStrike" dirty="0">
+                <a:solidFill>
+                  <a:srgbClr val="33006F"/>
+                </a:solidFill>
+                <a:effectLst/>
+                <a:latin typeface="Open Sans" panose="020B0606030504020204" pitchFamily="34" charset="0"/>
+                <a:ea typeface="Open Sans" panose="020B0606030504020204" pitchFamily="34" charset="0"/>
+                <a:cs typeface="Open Sans" panose="020B0606030504020204" pitchFamily="34" charset="0"/>
+              </a:rPr>
+              <a:t>Misclassification patterns: </a:t>
+            </a:r>
+            <a:r>
+              <a:rPr lang="en-US" sz="1800" b="0" i="0" u="none" strike="noStrike" dirty="0">
+                <a:solidFill>
+                  <a:srgbClr val="000000"/>
+                </a:solidFill>
+                <a:effectLst/>
+                <a:latin typeface="Open Sans" panose="020B0606030504020204" pitchFamily="34" charset="0"/>
+                <a:ea typeface="Open Sans" panose="020B0606030504020204" pitchFamily="34" charset="0"/>
+                <a:cs typeface="Open Sans" panose="020B0606030504020204" pitchFamily="34" charset="0"/>
+              </a:rPr>
+              <a:t>Model tends to misclassify when detectors have conflicting data.</a:t>
+            </a:r>
+          </a:p>
+          <a:p>
+            <a:pPr marL="285750" indent="-285750">
+              <a:buFont typeface="Arial" panose="020B0604020202020204" pitchFamily="34" charset="0"/>
+              <a:buChar char="•"/>
+            </a:pPr>
+            <a:r>
+              <a:rPr lang="en-US" sz="1800" b="1" i="0" u="none" strike="noStrike" dirty="0">
+                <a:solidFill>
+                  <a:srgbClr val="33006F"/>
+                </a:solidFill>
+                <a:effectLst/>
+                <a:latin typeface="Open Sans" panose="020B0606030504020204" pitchFamily="34" charset="0"/>
+                <a:ea typeface="Open Sans" panose="020B0606030504020204" pitchFamily="34" charset="0"/>
+                <a:cs typeface="Open Sans" panose="020B0606030504020204" pitchFamily="34" charset="0"/>
+              </a:rPr>
+              <a:t>Example misclassification: </a:t>
+            </a:r>
+            <a:r>
+              <a:rPr lang="en-US" sz="1800" b="0" i="0" u="none" strike="noStrike" dirty="0">
+                <a:solidFill>
+                  <a:srgbClr val="000000"/>
+                </a:solidFill>
+                <a:effectLst/>
+                <a:latin typeface="Open Sans" panose="020B0606030504020204" pitchFamily="34" charset="0"/>
+                <a:ea typeface="Open Sans" panose="020B0606030504020204" pitchFamily="34" charset="0"/>
+                <a:cs typeface="Open Sans" panose="020B0606030504020204" pitchFamily="34" charset="0"/>
+              </a:rPr>
+              <a:t>Last misclassified signal had Hanford detector observing noise while Livingston detector detected a signal, leading to both being classified as noise.</a:t>
+            </a:r>
+          </a:p>
+          <a:p>
+            <a:pPr marL="285750" indent="-285750">
+              <a:buFont typeface="Arial" panose="020B0604020202020204" pitchFamily="34" charset="0"/>
+              <a:buChar char="•"/>
+            </a:pPr>
+            <a:r>
+              <a:rPr lang="en-US" sz="1800" b="1" i="0" u="none" strike="noStrike" dirty="0">
+                <a:solidFill>
+                  <a:srgbClr val="33006F"/>
+                </a:solidFill>
+                <a:effectLst/>
+                <a:latin typeface="Open Sans" panose="020B0606030504020204" pitchFamily="34" charset="0"/>
+                <a:ea typeface="Open Sans" panose="020B0606030504020204" pitchFamily="34" charset="0"/>
+                <a:cs typeface="Open Sans" panose="020B0606030504020204" pitchFamily="34" charset="0"/>
+              </a:rPr>
+              <a:t>Possible flaws: </a:t>
+            </a:r>
+            <a:r>
+              <a:rPr lang="en-US" sz="1800" b="0" i="0" u="none" strike="noStrike" dirty="0">
+                <a:solidFill>
+                  <a:srgbClr val="000000"/>
+                </a:solidFill>
+                <a:effectLst/>
+                <a:latin typeface="Open Sans" panose="020B0606030504020204" pitchFamily="34" charset="0"/>
+                <a:ea typeface="Open Sans" panose="020B0606030504020204" pitchFamily="34" charset="0"/>
+                <a:cs typeface="Open Sans" panose="020B0606030504020204" pitchFamily="34" charset="0"/>
+              </a:rPr>
+              <a:t>Confusion may arise from contradictory signals between detectors or flaws in observatory data capture.</a:t>
+            </a:r>
           </a:p>
         </p:txBody>
       </p:sp>
@@ -4347,10 +4752,10 @@
         </p:nvGrpSpPr>
         <p:grpSpPr>
           <a:xfrm>
-            <a:off x="731520" y="7315200"/>
-            <a:ext cx="5753101" cy="935736"/>
-            <a:chOff x="627194" y="15388623"/>
-            <a:chExt cx="5753101" cy="935736"/>
+            <a:off x="457200" y="7315200"/>
+            <a:ext cx="6400800" cy="940896"/>
+            <a:chOff x="352874" y="15388623"/>
+            <a:chExt cx="6400800" cy="940896"/>
           </a:xfrm>
         </p:grpSpPr>
         <p:sp>
@@ -4361,8 +4766,8 @@
           </p:nvSpPr>
           <p:spPr>
             <a:xfrm>
-              <a:off x="627194" y="15388623"/>
-              <a:ext cx="5753101" cy="707886"/>
+              <a:off x="352874" y="15388623"/>
+              <a:ext cx="6400800" cy="707886"/>
             </a:xfrm>
             <a:prstGeom prst="rect">
               <a:avLst/>
@@ -4408,8 +4813,8 @@
           </p:blipFill>
           <p:spPr>
             <a:xfrm>
-              <a:off x="718634" y="16211583"/>
-              <a:ext cx="1399032" cy="112776"/>
+              <a:off x="444314" y="16211583"/>
+              <a:ext cx="1463040" cy="117936"/>
             </a:xfrm>
             <a:prstGeom prst="rect">
               <a:avLst/>
@@ -4425,8 +4830,8 @@
         </p:nvSpPr>
         <p:spPr>
           <a:xfrm>
-            <a:off x="731520" y="8503920"/>
-            <a:ext cx="6400800" cy="3139321"/>
+            <a:off x="457200" y="8412480"/>
+            <a:ext cx="6400800" cy="3383280"/>
           </a:xfrm>
           <a:prstGeom prst="rect">
             <a:avLst/>
@@ -4439,6 +4844,21 @@
           </a:bodyPr>
           <a:lstStyle/>
           <a:p>
+            <a:pPr marL="285750" indent="-285750">
+              <a:buFont typeface="Arial" panose="020B0604020202020204" pitchFamily="34" charset="0"/>
+              <a:buChar char="•"/>
+            </a:pPr>
+            <a:r>
+              <a:rPr lang="en-US" sz="1800" b="1" dirty="0">
+                <a:solidFill>
+                  <a:srgbClr val="33006F"/>
+                </a:solidFill>
+                <a:latin typeface="Open Sans" panose="020B0606030504020204" pitchFamily="34" charset="0"/>
+                <a:ea typeface="Open Sans" panose="020B0606030504020204" pitchFamily="34" charset="0"/>
+                <a:cs typeface="Open Sans" panose="020B0606030504020204" pitchFamily="34" charset="0"/>
+              </a:rPr>
+              <a:t>Dataset source: </a:t>
+            </a:r>
             <a:r>
               <a:rPr lang="en-US" sz="1800" dirty="0">
                 <a:solidFill>
@@ -4448,7 +4868,7 @@
                 <a:ea typeface="Open Sans" panose="020B0606030504020204" pitchFamily="34" charset="0"/>
                 <a:cs typeface="Open Sans" panose="020B0606030504020204" pitchFamily="34" charset="0"/>
               </a:rPr>
-              <a:t>T</a:t>
+              <a:t>Glitch dataset originates from the Laser Interferometer Gravitational-Wave Observatory (LIGO) </a:t>
             </a:r>
             <a:r>
               <a:rPr lang="en-US" sz="1800" b="0" i="0" u="none" strike="noStrike" dirty="0">
@@ -4460,7 +4880,7 @@
                 <a:ea typeface="Open Sans" panose="020B0606030504020204" pitchFamily="34" charset="0"/>
                 <a:cs typeface="Open Sans" panose="020B0606030504020204" pitchFamily="34" charset="0"/>
               </a:rPr>
-              <a:t>he Glitch dataset originates from the Laser Interferometer Gravitational-Wave Observatory (LIGO), an observatory designed to harness the characteristics of light and space in order to identify and comprehend the sources of gravitational waves.  We analyze a dataset consisting of four distinct data categories: Glitch, Background, Binary Black Hole (BBH), and Sine-Gaussian (SG).  Our objective is to develop a binary classifier capable of identifying signals as either Glitch/Background or Binary Black Hole/Sine-Gaussian.</a:t>
+              <a:t>in Hanford, WA, and Livingston, LA.</a:t>
             </a:r>
             <a:endParaRPr lang="en-US" sz="1800" dirty="0">
               <a:solidFill>
@@ -4472,6 +4892,90 @@
             </a:endParaRPr>
           </a:p>
           <a:p>
+            <a:pPr marL="285750" indent="-285750">
+              <a:buFont typeface="Arial" panose="020B0604020202020204" pitchFamily="34" charset="0"/>
+              <a:buChar char="•"/>
+            </a:pPr>
+            <a:r>
+              <a:rPr lang="en-US" sz="1800" b="1" dirty="0">
+                <a:solidFill>
+                  <a:srgbClr val="33006F"/>
+                </a:solidFill>
+                <a:latin typeface="Open Sans" panose="020B0606030504020204" pitchFamily="34" charset="0"/>
+                <a:ea typeface="Open Sans" panose="020B0606030504020204" pitchFamily="34" charset="0"/>
+                <a:cs typeface="Open Sans" panose="020B0606030504020204" pitchFamily="34" charset="0"/>
+              </a:rPr>
+              <a:t>LIGO observatory: </a:t>
+            </a:r>
+            <a:r>
+              <a:rPr lang="en-US" sz="1800" dirty="0">
+                <a:solidFill>
+                  <a:srgbClr val="000000"/>
+                </a:solidFill>
+                <a:latin typeface="Open Sans" panose="020B0606030504020204" pitchFamily="34" charset="0"/>
+                <a:ea typeface="Open Sans" panose="020B0606030504020204" pitchFamily="34" charset="0"/>
+                <a:cs typeface="Open Sans" panose="020B0606030504020204" pitchFamily="34" charset="0"/>
+              </a:rPr>
+              <a:t>Designed to identify and understand the sources of gravitational waves using light and space characteristics.</a:t>
+            </a:r>
+          </a:p>
+          <a:p>
+            <a:pPr marL="285750" indent="-285750">
+              <a:buFont typeface="Arial" panose="020B0604020202020204" pitchFamily="34" charset="0"/>
+              <a:buChar char="•"/>
+            </a:pPr>
+            <a:r>
+              <a:rPr lang="en-US" sz="1800" b="1" dirty="0">
+                <a:solidFill>
+                  <a:srgbClr val="33006F"/>
+                </a:solidFill>
+                <a:latin typeface="Open Sans" panose="020B0606030504020204" pitchFamily="34" charset="0"/>
+                <a:ea typeface="Open Sans" panose="020B0606030504020204" pitchFamily="34" charset="0"/>
+                <a:cs typeface="Open Sans" panose="020B0606030504020204" pitchFamily="34" charset="0"/>
+              </a:rPr>
+              <a:t>Dataset categories: </a:t>
+            </a:r>
+            <a:r>
+              <a:rPr lang="en-US" sz="1800" dirty="0">
+                <a:solidFill>
+                  <a:srgbClr val="000000"/>
+                </a:solidFill>
+                <a:latin typeface="Open Sans" panose="020B0606030504020204" pitchFamily="34" charset="0"/>
+                <a:ea typeface="Open Sans" panose="020B0606030504020204" pitchFamily="34" charset="0"/>
+                <a:cs typeface="Open Sans" panose="020B0606030504020204" pitchFamily="34" charset="0"/>
+              </a:rPr>
+              <a:t>Consists of four distinct data categories - Glitch, Background, Binary Black Hole (BBH), and Sine-Gaussian (SG).</a:t>
+            </a:r>
+          </a:p>
+          <a:p>
+            <a:pPr marL="285750" indent="-285750">
+              <a:buFont typeface="Arial" panose="020B0604020202020204" pitchFamily="34" charset="0"/>
+              <a:buChar char="•"/>
+            </a:pPr>
+            <a:r>
+              <a:rPr lang="en-US" sz="1800" b="1" dirty="0">
+                <a:solidFill>
+                  <a:srgbClr val="33006F"/>
+                </a:solidFill>
+                <a:latin typeface="Open Sans" panose="020B0606030504020204" pitchFamily="34" charset="0"/>
+                <a:ea typeface="Open Sans" panose="020B0606030504020204" pitchFamily="34" charset="0"/>
+                <a:cs typeface="Open Sans" panose="020B0606030504020204" pitchFamily="34" charset="0"/>
+              </a:rPr>
+              <a:t>Objective: </a:t>
+            </a:r>
+            <a:r>
+              <a:rPr lang="en-US" sz="1800" dirty="0">
+                <a:solidFill>
+                  <a:srgbClr val="000000"/>
+                </a:solidFill>
+                <a:latin typeface="Open Sans" panose="020B0606030504020204" pitchFamily="34" charset="0"/>
+                <a:ea typeface="Open Sans" panose="020B0606030504020204" pitchFamily="34" charset="0"/>
+                <a:cs typeface="Open Sans" panose="020B0606030504020204" pitchFamily="34" charset="0"/>
+              </a:rPr>
+              <a:t>Develop a binary classifier to identify signals as either Glitch/Background or Binary Black Hole/Sine-Gaussian.</a:t>
+            </a:r>
+          </a:p>
+          <a:p>
             <a:endParaRPr lang="en-US" sz="1800" dirty="0">
               <a:solidFill>
                 <a:srgbClr val="000000"/>
@@ -4488,8 +4992,8 @@
         </p:nvSpPr>
         <p:spPr>
           <a:xfrm>
-            <a:off x="873679" y="31729680"/>
-            <a:ext cx="5744042" cy="307777"/>
+            <a:off x="2377440" y="26426160"/>
+            <a:ext cx="2560320" cy="307777"/>
           </a:xfrm>
           <a:prstGeom prst="rect">
             <a:avLst/>
@@ -4524,10 +5028,10 @@
         </p:nvGrpSpPr>
         <p:grpSpPr>
           <a:xfrm>
-            <a:off x="731520" y="21031200"/>
-            <a:ext cx="5888740" cy="935736"/>
+            <a:off x="457200" y="16733520"/>
+            <a:ext cx="6400800" cy="938179"/>
             <a:chOff x="688946" y="15565887"/>
-            <a:chExt cx="5753101" cy="935736"/>
+            <a:chExt cx="6253364" cy="938179"/>
           </a:xfrm>
         </p:grpSpPr>
         <p:sp>
@@ -4539,7 +5043,7 @@
           <p:spPr>
             <a:xfrm>
               <a:off x="688946" y="15565887"/>
-              <a:ext cx="5753101" cy="707886"/>
+              <a:ext cx="6253364" cy="707886"/>
             </a:xfrm>
             <a:prstGeom prst="rect">
               <a:avLst/>
@@ -4586,7 +5090,7 @@
           <p:spPr>
             <a:xfrm>
               <a:off x="778280" y="16388847"/>
-              <a:ext cx="1399032" cy="112776"/>
+              <a:ext cx="1429340" cy="115219"/>
             </a:xfrm>
             <a:prstGeom prst="rect">
               <a:avLst/>
@@ -4594,228 +5098,353 @@
           </p:spPr>
         </p:pic>
       </p:grpSp>
-      <mc:AlternateContent xmlns:mc="http://schemas.openxmlformats.org/markup-compatibility/2006">
-        <mc:Choice xmlns:a14="http://schemas.microsoft.com/office/drawing/2010/main" Requires="a14">
-          <p:sp>
-            <p:nvSpPr>
-              <p:cNvPr id="70" name="TextBox 69"/>
-              <p:cNvSpPr txBox="1"/>
-              <p:nvPr/>
-            </p:nvSpPr>
-            <p:spPr>
-              <a:xfrm>
-                <a:off x="731520" y="22219920"/>
-                <a:ext cx="6400800" cy="7848302"/>
-              </a:xfrm>
-              <a:prstGeom prst="rect">
-                <a:avLst/>
-              </a:prstGeom>
-              <a:noFill/>
-            </p:spPr>
-            <p:txBody>
-              <a:bodyPr wrap="square" rtlCol="0">
-                <a:spAutoFit/>
-              </a:bodyPr>
-              <a:lstStyle/>
-              <a:p>
-                <a:r>
-                  <a:rPr lang="en-US" sz="1800" b="0" i="0" u="none" strike="noStrike" dirty="0">
-                    <a:solidFill>
-                      <a:srgbClr val="000000"/>
-                    </a:solidFill>
-                    <a:effectLst/>
-                    <a:latin typeface="Open Sans" panose="020B0606030504020204" pitchFamily="34" charset="0"/>
-                    <a:ea typeface="Open Sans" panose="020B0606030504020204" pitchFamily="34" charset="0"/>
-                    <a:cs typeface="Open Sans" panose="020B0606030504020204" pitchFamily="34" charset="0"/>
-                  </a:rPr>
-                  <a:t>To solve this problem, we utilize </a:t>
-                </a:r>
-                <a:r>
-                  <a:rPr lang="en-US" sz="1800" b="0" i="0" u="none" strike="noStrike" dirty="0" err="1">
-                    <a:solidFill>
-                      <a:srgbClr val="000000"/>
-                    </a:solidFill>
-                    <a:effectLst/>
-                    <a:latin typeface="Open Sans" panose="020B0606030504020204" pitchFamily="34" charset="0"/>
-                    <a:ea typeface="Open Sans" panose="020B0606030504020204" pitchFamily="34" charset="0"/>
-                    <a:cs typeface="Open Sans" panose="020B0606030504020204" pitchFamily="34" charset="0"/>
-                  </a:rPr>
-                  <a:t>PyTorch</a:t>
-                </a:r>
-                <a:r>
-                  <a:rPr lang="en-US" sz="1800" b="0" i="0" u="none" strike="noStrike" dirty="0">
-                    <a:solidFill>
-                      <a:srgbClr val="000000"/>
-                    </a:solidFill>
-                    <a:effectLst/>
-                    <a:latin typeface="Open Sans" panose="020B0606030504020204" pitchFamily="34" charset="0"/>
-                    <a:ea typeface="Open Sans" panose="020B0606030504020204" pitchFamily="34" charset="0"/>
-                    <a:cs typeface="Open Sans" panose="020B0606030504020204" pitchFamily="34" charset="0"/>
-                  </a:rPr>
-                  <a:t> to implement a binary classifier that takes a time series as input and outputs either signal (for glitch/background data) or background (for binary black hole/sine-Gaussian data).  Before passing data to our classifier, we need to convert from time series to a 2D image in order for our CNN to parse it.  We accomplish this process using </a:t>
-                </a:r>
-                <a:r>
-                  <a:rPr lang="en-US" sz="1800" b="0" i="0" u="none" strike="noStrike" dirty="0" err="1">
-                    <a:solidFill>
-                      <a:srgbClr val="000000"/>
-                    </a:solidFill>
-                    <a:effectLst/>
-                    <a:latin typeface="Open Sans" panose="020B0606030504020204" pitchFamily="34" charset="0"/>
-                    <a:ea typeface="Open Sans" panose="020B0606030504020204" pitchFamily="34" charset="0"/>
-                    <a:cs typeface="Open Sans" panose="020B0606030504020204" pitchFamily="34" charset="0"/>
-                  </a:rPr>
-                  <a:t>Gramian</a:t>
-                </a:r>
-                <a:r>
-                  <a:rPr lang="en-US" sz="1800" b="0" i="0" u="none" strike="noStrike" dirty="0">
-                    <a:solidFill>
-                      <a:srgbClr val="000000"/>
-                    </a:solidFill>
-                    <a:effectLst/>
-                    <a:latin typeface="Open Sans" panose="020B0606030504020204" pitchFamily="34" charset="0"/>
-                    <a:ea typeface="Open Sans" panose="020B0606030504020204" pitchFamily="34" charset="0"/>
-                    <a:cs typeface="Open Sans" panose="020B0606030504020204" pitchFamily="34" charset="0"/>
-                  </a:rPr>
-                  <a:t> Angular Fields (GAFs) as implemented in the Python library</a:t>
-                </a:r>
-                <a:r>
-                  <a:rPr lang="en-US" sz="1800" dirty="0">
-                    <a:solidFill>
-                      <a:srgbClr val="33006F"/>
-                    </a:solidFill>
-                    <a:latin typeface="Open Sans" panose="020B0606030504020204" pitchFamily="34" charset="0"/>
-                    <a:ea typeface="Open Sans" panose="020B0606030504020204" pitchFamily="34" charset="0"/>
-                    <a:cs typeface="Open Sans" panose="020B0606030504020204" pitchFamily="34" charset="0"/>
-                  </a:rPr>
-                  <a:t>, </a:t>
-                </a:r>
-                <a:r>
-                  <a:rPr lang="en-US" sz="1800" i="1" dirty="0" err="1">
-                    <a:solidFill>
-                      <a:srgbClr val="000000"/>
-                    </a:solidFill>
-                    <a:latin typeface="Open Sans" panose="020B0606030504020204" pitchFamily="34" charset="0"/>
-                    <a:ea typeface="Open Sans" panose="020B0606030504020204" pitchFamily="34" charset="0"/>
-                    <a:cs typeface="Open Sans" panose="020B0606030504020204" pitchFamily="34" charset="0"/>
-                  </a:rPr>
-                  <a:t>pyts</a:t>
-                </a:r>
-                <a:r>
-                  <a:rPr lang="en-US" sz="1800" b="0" i="0" u="none" strike="noStrike" dirty="0">
-                    <a:solidFill>
-                      <a:srgbClr val="000000"/>
-                    </a:solidFill>
-                    <a:effectLst/>
-                    <a:latin typeface="Open Sans" panose="020B0606030504020204" pitchFamily="34" charset="0"/>
-                    <a:ea typeface="Open Sans" panose="020B0606030504020204" pitchFamily="34" charset="0"/>
-                    <a:cs typeface="Open Sans" panose="020B0606030504020204" pitchFamily="34" charset="0"/>
-                  </a:rPr>
-                  <a:t>.  All GAF images are 28x28 pixels, which was found to be a good compromise between performance and accuracy.  Next, we split our data into training (70%, 102227 images), testing (15%, 21910 images), and validation (15%, 21908 images) lists.  These are then passed into our CNN architecture, which begins with a convolution layer of 2 input channels and 16 output channels followed by a convolution layer with 16 input channels and 32 output channels; each has kernel size 5, stride length 1, and padding 2.  Following each of these convolution layers is a max pooling layer of kernel size 2, stride 2, and padding 0.   Finally, the network contains 3 subsequent linear, fully connected layers of decreasing size followed by the output; their exact input and output dimensions are 1568x128, 128x64, and 64x2.  We trained the model for 16 epochs at a learning rate of </a:t>
-                </a:r>
-                <a14:m>
-                  <m:oMath xmlns:m="http://schemas.openxmlformats.org/officeDocument/2006/math">
-                    <m:sSup>
-                      <m:sSupPr>
-                        <m:ctrlPr>
-                          <a:rPr lang="en-US" sz="1800" b="0" i="1" u="none" strike="noStrike" smtClean="0">
-                            <a:solidFill>
-                              <a:srgbClr val="000000"/>
-                            </a:solidFill>
-                            <a:effectLst/>
-                            <a:latin typeface="Cambria Math" panose="02040503050406030204" pitchFamily="18" charset="0"/>
-                          </a:rPr>
-                        </m:ctrlPr>
-                      </m:sSupPr>
-                      <m:e>
-                        <m:r>
-                          <a:rPr lang="en-US" sz="1800" b="0" i="1" u="none" strike="noStrike" smtClean="0">
-                            <a:solidFill>
-                              <a:srgbClr val="000000"/>
-                            </a:solidFill>
-                            <a:effectLst/>
-                            <a:latin typeface="Cambria Math" panose="02040503050406030204" pitchFamily="18" charset="0"/>
-                          </a:rPr>
-                          <m:t>5⋅10</m:t>
-                        </m:r>
-                      </m:e>
-                      <m:sup>
-                        <m:r>
-                          <a:rPr lang="en-US" sz="1800" b="0" i="1" u="none" strike="noStrike" smtClean="0">
-                            <a:solidFill>
-                              <a:srgbClr val="000000"/>
-                            </a:solidFill>
-                            <a:effectLst/>
-                            <a:latin typeface="Cambria Math" panose="02040503050406030204" pitchFamily="18" charset="0"/>
-                          </a:rPr>
-                          <m:t>−6</m:t>
-                        </m:r>
-                      </m:sup>
-                    </m:sSup>
-                  </m:oMath>
-                </a14:m>
-                <a:r>
-                  <a:rPr lang="en-US" sz="1800" b="0" i="0" u="none" strike="noStrike" dirty="0">
-                    <a:solidFill>
-                      <a:srgbClr val="000000"/>
-                    </a:solidFill>
-                    <a:effectLst/>
-                    <a:latin typeface="Open Sans" panose="020B0606030504020204" pitchFamily="34" charset="0"/>
-                    <a:ea typeface="Open Sans" panose="020B0606030504020204" pitchFamily="34" charset="0"/>
-                    <a:cs typeface="Open Sans" panose="020B0606030504020204" pitchFamily="34" charset="0"/>
-                  </a:rPr>
-                  <a:t> in batches of 677 with an L2 regularization term of coefficient 0.001 to decay weights and reduce overfitting.  The network was subsequently trained using a cross-entropy loss function and Adam optimizer.</a:t>
-                </a:r>
-                <a:endParaRPr lang="en-US" sz="1800" dirty="0">
-                  <a:solidFill>
-                    <a:srgbClr val="000000"/>
-                  </a:solidFill>
-                  <a:latin typeface="Open Sans" panose="020B0606030504020204" pitchFamily="34" charset="0"/>
-                  <a:ea typeface="Open Sans" panose="020B0606030504020204" pitchFamily="34" charset="0"/>
-                  <a:cs typeface="Open Sans" panose="020B0606030504020204" pitchFamily="34" charset="0"/>
-                </a:endParaRPr>
-              </a:p>
-            </p:txBody>
-          </p:sp>
-        </mc:Choice>
-        <mc:Fallback>
-          <p:sp>
-            <p:nvSpPr>
-              <p:cNvPr id="70" name="TextBox 69"/>
-              <p:cNvSpPr txBox="1">
-                <a:spLocks noRot="1" noChangeAspect="1" noMove="1" noResize="1" noEditPoints="1" noAdjustHandles="1" noChangeArrowheads="1" noChangeShapeType="1" noTextEdit="1"/>
-              </p:cNvSpPr>
-              <p:nvPr/>
-            </p:nvSpPr>
-            <p:spPr>
-              <a:xfrm>
-                <a:off x="731520" y="22219920"/>
-                <a:ext cx="6400800" cy="7848302"/>
-              </a:xfrm>
-              <a:prstGeom prst="rect">
-                <a:avLst/>
-              </a:prstGeom>
-              <a:blipFill>
-                <a:blip r:embed="rId4"/>
-                <a:stretch>
-                  <a:fillRect l="-762" t="-389" b="-311"/>
-                </a:stretch>
-              </a:blipFill>
-            </p:spPr>
-            <p:txBody>
-              <a:bodyPr/>
-              <a:lstStyle/>
-              <a:p>
-                <a:r>
-                  <a:rPr lang="en-US">
-                    <a:noFill/>
-                  </a:rPr>
-                  <a:t> </a:t>
-                </a:r>
-              </a:p>
-            </p:txBody>
-          </p:sp>
-        </mc:Fallback>
-      </mc:AlternateContent>
+      <p:sp>
+        <p:nvSpPr>
+          <p:cNvPr id="70" name="TextBox 69"/>
+          <p:cNvSpPr txBox="1"/>
+          <p:nvPr/>
+        </p:nvSpPr>
+        <p:spPr>
+          <a:xfrm>
+            <a:off x="457200" y="17830800"/>
+            <a:ext cx="6400800" cy="6949440"/>
+          </a:xfrm>
+          <a:prstGeom prst="rect">
+            <a:avLst/>
+          </a:prstGeom>
+          <a:noFill/>
+        </p:spPr>
+        <p:txBody>
+          <a:bodyPr wrap="square" rtlCol="0">
+            <a:spAutoFit/>
+          </a:bodyPr>
+          <a:lstStyle/>
+          <a:p>
+            <a:pPr marL="285750" indent="-285750">
+              <a:buFont typeface="Arial" panose="020B0604020202020204" pitchFamily="34" charset="0"/>
+              <a:buChar char="•"/>
+            </a:pPr>
+            <a:r>
+              <a:rPr lang="en-US" sz="1800" b="1" dirty="0">
+                <a:solidFill>
+                  <a:srgbClr val="33006F"/>
+                </a:solidFill>
+                <a:latin typeface="Open Sans" panose="020B0606030504020204" pitchFamily="34" charset="0"/>
+                <a:ea typeface="Open Sans" panose="020B0606030504020204" pitchFamily="34" charset="0"/>
+                <a:cs typeface="Open Sans" panose="020B0606030504020204" pitchFamily="34" charset="0"/>
+              </a:rPr>
+              <a:t>Problem: </a:t>
+            </a:r>
+            <a:r>
+              <a:rPr lang="en-US" sz="1800" dirty="0">
+                <a:solidFill>
+                  <a:srgbClr val="000000"/>
+                </a:solidFill>
+                <a:latin typeface="Open Sans" panose="020B0606030504020204" pitchFamily="34" charset="0"/>
+                <a:ea typeface="Open Sans" panose="020B0606030504020204" pitchFamily="34" charset="0"/>
+                <a:cs typeface="Open Sans" panose="020B0606030504020204" pitchFamily="34" charset="0"/>
+              </a:rPr>
+              <a:t>Implementing a binary classifier using </a:t>
+            </a:r>
+            <a:r>
+              <a:rPr lang="en-US" sz="1800" dirty="0" err="1">
+                <a:solidFill>
+                  <a:srgbClr val="000000"/>
+                </a:solidFill>
+                <a:latin typeface="Open Sans" panose="020B0606030504020204" pitchFamily="34" charset="0"/>
+                <a:ea typeface="Open Sans" panose="020B0606030504020204" pitchFamily="34" charset="0"/>
+                <a:cs typeface="Open Sans" panose="020B0606030504020204" pitchFamily="34" charset="0"/>
+              </a:rPr>
+              <a:t>PyTorch</a:t>
+            </a:r>
+            <a:r>
+              <a:rPr lang="en-US" sz="1800" dirty="0">
+                <a:solidFill>
+                  <a:srgbClr val="000000"/>
+                </a:solidFill>
+                <a:latin typeface="Open Sans" panose="020B0606030504020204" pitchFamily="34" charset="0"/>
+                <a:ea typeface="Open Sans" panose="020B0606030504020204" pitchFamily="34" charset="0"/>
+                <a:cs typeface="Open Sans" panose="020B0606030504020204" pitchFamily="34" charset="0"/>
+              </a:rPr>
+              <a:t> for time series data.</a:t>
+            </a:r>
+          </a:p>
+          <a:p>
+            <a:pPr marL="285750" indent="-285750">
+              <a:buFont typeface="Arial" panose="020B0604020202020204" pitchFamily="34" charset="0"/>
+              <a:buChar char="•"/>
+            </a:pPr>
+            <a:r>
+              <a:rPr lang="en-US" sz="1800" b="1" dirty="0">
+                <a:solidFill>
+                  <a:srgbClr val="33006F"/>
+                </a:solidFill>
+                <a:latin typeface="Open Sans" panose="020B0606030504020204" pitchFamily="34" charset="0"/>
+                <a:ea typeface="Open Sans" panose="020B0606030504020204" pitchFamily="34" charset="0"/>
+                <a:cs typeface="Open Sans" panose="020B0606030504020204" pitchFamily="34" charset="0"/>
+              </a:rPr>
+              <a:t>Conversion: </a:t>
+            </a:r>
+            <a:r>
+              <a:rPr lang="en-US" sz="1800" dirty="0">
+                <a:solidFill>
+                  <a:srgbClr val="000000"/>
+                </a:solidFill>
+                <a:latin typeface="Open Sans" panose="020B0606030504020204" pitchFamily="34" charset="0"/>
+                <a:ea typeface="Open Sans" panose="020B0606030504020204" pitchFamily="34" charset="0"/>
+                <a:cs typeface="Open Sans" panose="020B0606030504020204" pitchFamily="34" charset="0"/>
+              </a:rPr>
+              <a:t>Convert time series data to 2D images using </a:t>
+            </a:r>
+            <a:r>
+              <a:rPr lang="en-US" sz="1800" dirty="0" err="1">
+                <a:solidFill>
+                  <a:srgbClr val="000000"/>
+                </a:solidFill>
+                <a:latin typeface="Open Sans" panose="020B0606030504020204" pitchFamily="34" charset="0"/>
+                <a:ea typeface="Open Sans" panose="020B0606030504020204" pitchFamily="34" charset="0"/>
+                <a:cs typeface="Open Sans" panose="020B0606030504020204" pitchFamily="34" charset="0"/>
+              </a:rPr>
+              <a:t>Gramian</a:t>
+            </a:r>
+            <a:r>
+              <a:rPr lang="en-US" sz="1800" dirty="0">
+                <a:solidFill>
+                  <a:srgbClr val="000000"/>
+                </a:solidFill>
+                <a:latin typeface="Open Sans" panose="020B0606030504020204" pitchFamily="34" charset="0"/>
+                <a:ea typeface="Open Sans" panose="020B0606030504020204" pitchFamily="34" charset="0"/>
+                <a:cs typeface="Open Sans" panose="020B0606030504020204" pitchFamily="34" charset="0"/>
+              </a:rPr>
+              <a:t> Angular Fields (GAFs) with </a:t>
+            </a:r>
+            <a:r>
+              <a:rPr lang="en-US" sz="1800" dirty="0" err="1">
+                <a:solidFill>
+                  <a:srgbClr val="000000"/>
+                </a:solidFill>
+                <a:latin typeface="Open Sans" panose="020B0606030504020204" pitchFamily="34" charset="0"/>
+                <a:ea typeface="Open Sans" panose="020B0606030504020204" pitchFamily="34" charset="0"/>
+                <a:cs typeface="Open Sans" panose="020B0606030504020204" pitchFamily="34" charset="0"/>
+              </a:rPr>
+              <a:t>pyts</a:t>
+            </a:r>
+            <a:r>
+              <a:rPr lang="en-US" sz="1800" dirty="0">
+                <a:solidFill>
+                  <a:srgbClr val="000000"/>
+                </a:solidFill>
+                <a:latin typeface="Open Sans" panose="020B0606030504020204" pitchFamily="34" charset="0"/>
+                <a:ea typeface="Open Sans" panose="020B0606030504020204" pitchFamily="34" charset="0"/>
+                <a:cs typeface="Open Sans" panose="020B0606030504020204" pitchFamily="34" charset="0"/>
+              </a:rPr>
+              <a:t> library.</a:t>
+            </a:r>
+          </a:p>
+          <a:p>
+            <a:pPr marL="285750" indent="-285750">
+              <a:buFont typeface="Arial" panose="020B0604020202020204" pitchFamily="34" charset="0"/>
+              <a:buChar char="•"/>
+            </a:pPr>
+            <a:r>
+              <a:rPr lang="en-US" sz="1800" dirty="0">
+                <a:solidFill>
+                  <a:srgbClr val="000000"/>
+                </a:solidFill>
+                <a:latin typeface="Open Sans" panose="020B0606030504020204" pitchFamily="34" charset="0"/>
+                <a:ea typeface="Open Sans" panose="020B0606030504020204" pitchFamily="34" charset="0"/>
+                <a:cs typeface="Open Sans" panose="020B0606030504020204" pitchFamily="34" charset="0"/>
+              </a:rPr>
+              <a:t>Image size: GAF images are 28x28 pixels for a balance between performance and accuracy.</a:t>
+            </a:r>
+          </a:p>
+          <a:p>
+            <a:pPr marL="285750" indent="-285750">
+              <a:buFont typeface="Arial" panose="020B0604020202020204" pitchFamily="34" charset="0"/>
+              <a:buChar char="•"/>
+            </a:pPr>
+            <a:r>
+              <a:rPr lang="en-US" sz="1800" b="1" dirty="0">
+                <a:solidFill>
+                  <a:srgbClr val="33006F"/>
+                </a:solidFill>
+                <a:latin typeface="Open Sans" panose="020B0606030504020204" pitchFamily="34" charset="0"/>
+                <a:ea typeface="Open Sans" panose="020B0606030504020204" pitchFamily="34" charset="0"/>
+                <a:cs typeface="Open Sans" panose="020B0606030504020204" pitchFamily="34" charset="0"/>
+              </a:rPr>
+              <a:t>Data splitting: </a:t>
+            </a:r>
+            <a:r>
+              <a:rPr lang="en-US" sz="1800" dirty="0">
+                <a:solidFill>
+                  <a:srgbClr val="000000"/>
+                </a:solidFill>
+                <a:latin typeface="Open Sans" panose="020B0606030504020204" pitchFamily="34" charset="0"/>
+                <a:ea typeface="Open Sans" panose="020B0606030504020204" pitchFamily="34" charset="0"/>
+                <a:cs typeface="Open Sans" panose="020B0606030504020204" pitchFamily="34" charset="0"/>
+              </a:rPr>
+              <a:t>Split data into training (70%, 102227 images), testing (15%, 21910 images), and validation (15%, 21908 images) sets.</a:t>
+            </a:r>
+          </a:p>
+          <a:p>
+            <a:pPr marL="285750" indent="-285750">
+              <a:buFont typeface="Arial" panose="020B0604020202020204" pitchFamily="34" charset="0"/>
+              <a:buChar char="•"/>
+            </a:pPr>
+            <a:r>
+              <a:rPr lang="en-US" sz="1800" b="1" dirty="0">
+                <a:solidFill>
+                  <a:srgbClr val="33006F"/>
+                </a:solidFill>
+                <a:latin typeface="Open Sans" panose="020B0606030504020204" pitchFamily="34" charset="0"/>
+                <a:ea typeface="Open Sans" panose="020B0606030504020204" pitchFamily="34" charset="0"/>
+                <a:cs typeface="Open Sans" panose="020B0606030504020204" pitchFamily="34" charset="0"/>
+              </a:rPr>
+              <a:t>CNN architecture:</a:t>
+            </a:r>
+          </a:p>
+          <a:p>
+            <a:pPr marL="822960" lvl="1" indent="-285750">
+              <a:buFont typeface="Courier New" panose="02070309020205020404" pitchFamily="49" charset="0"/>
+              <a:buChar char="o"/>
+            </a:pPr>
+            <a:r>
+              <a:rPr lang="en-US" sz="1800" i="1" dirty="0">
+                <a:solidFill>
+                  <a:srgbClr val="33006F"/>
+                </a:solidFill>
+                <a:latin typeface="Open Sans" panose="020B0606030504020204" pitchFamily="34" charset="0"/>
+                <a:ea typeface="Open Sans" panose="020B0606030504020204" pitchFamily="34" charset="0"/>
+                <a:cs typeface="Open Sans" panose="020B0606030504020204" pitchFamily="34" charset="0"/>
+              </a:rPr>
+              <a:t>Convolution layers: </a:t>
+            </a:r>
+            <a:r>
+              <a:rPr lang="en-US" sz="1800" dirty="0">
+                <a:solidFill>
+                  <a:srgbClr val="000000"/>
+                </a:solidFill>
+                <a:latin typeface="Open Sans" panose="020B0606030504020204" pitchFamily="34" charset="0"/>
+                <a:ea typeface="Open Sans" panose="020B0606030504020204" pitchFamily="34" charset="0"/>
+                <a:cs typeface="Open Sans" panose="020B0606030504020204" pitchFamily="34" charset="0"/>
+              </a:rPr>
+              <a:t>Two convolution layers with 2 input channels, 16 output channels, kernel size 5, stride length 1, and padding 2; and 16 input channels, 32 output channels, kernel size 5, stride length 1, and padding 2.</a:t>
+            </a:r>
+          </a:p>
+          <a:p>
+            <a:pPr marL="822960" lvl="1" indent="-285750">
+              <a:buFont typeface="Courier New" panose="02070309020205020404" pitchFamily="49" charset="0"/>
+              <a:buChar char="o"/>
+            </a:pPr>
+            <a:r>
+              <a:rPr lang="en-US" sz="1800" i="1" dirty="0">
+                <a:solidFill>
+                  <a:srgbClr val="33006F"/>
+                </a:solidFill>
+                <a:latin typeface="Open Sans" panose="020B0606030504020204" pitchFamily="34" charset="0"/>
+                <a:ea typeface="Open Sans" panose="020B0606030504020204" pitchFamily="34" charset="0"/>
+                <a:cs typeface="Open Sans" panose="020B0606030504020204" pitchFamily="34" charset="0"/>
+              </a:rPr>
+              <a:t>Max pooling layers: </a:t>
+            </a:r>
+            <a:r>
+              <a:rPr lang="en-US" sz="1800" dirty="0">
+                <a:solidFill>
+                  <a:srgbClr val="000000"/>
+                </a:solidFill>
+                <a:latin typeface="Open Sans" panose="020B0606030504020204" pitchFamily="34" charset="0"/>
+                <a:ea typeface="Open Sans" panose="020B0606030504020204" pitchFamily="34" charset="0"/>
+                <a:cs typeface="Open Sans" panose="020B0606030504020204" pitchFamily="34" charset="0"/>
+              </a:rPr>
+              <a:t>Applied after each convolution layer with kernel size 2, stride 2, and padding 0.</a:t>
+            </a:r>
+          </a:p>
+          <a:p>
+            <a:pPr marL="822960" lvl="1" indent="-285750">
+              <a:buFont typeface="Courier New" panose="02070309020205020404" pitchFamily="49" charset="0"/>
+              <a:buChar char="o"/>
+            </a:pPr>
+            <a:r>
+              <a:rPr lang="en-US" sz="1800" i="1" dirty="0">
+                <a:solidFill>
+                  <a:srgbClr val="33006F"/>
+                </a:solidFill>
+                <a:latin typeface="Open Sans" panose="020B0606030504020204" pitchFamily="34" charset="0"/>
+                <a:ea typeface="Open Sans" panose="020B0606030504020204" pitchFamily="34" charset="0"/>
+                <a:cs typeface="Open Sans" panose="020B0606030504020204" pitchFamily="34" charset="0"/>
+              </a:rPr>
+              <a:t>Fully connected layers: </a:t>
+            </a:r>
+            <a:r>
+              <a:rPr lang="en-US" sz="1800" dirty="0">
+                <a:solidFill>
+                  <a:srgbClr val="000000"/>
+                </a:solidFill>
+                <a:latin typeface="Open Sans" panose="020B0606030504020204" pitchFamily="34" charset="0"/>
+                <a:ea typeface="Open Sans" panose="020B0606030504020204" pitchFamily="34" charset="0"/>
+                <a:cs typeface="Open Sans" panose="020B0606030504020204" pitchFamily="34" charset="0"/>
+              </a:rPr>
+              <a:t>Three subsequent linear layers with dimensions 1568x128, 128x64, and 64x2, respectively.</a:t>
+            </a:r>
+          </a:p>
+          <a:p>
+            <a:pPr marL="285750" indent="-285750">
+              <a:buFont typeface="Arial" panose="020B0604020202020204" pitchFamily="34" charset="0"/>
+              <a:buChar char="•"/>
+            </a:pPr>
+            <a:r>
+              <a:rPr lang="en-US" sz="1800" b="1" dirty="0">
+                <a:solidFill>
+                  <a:srgbClr val="33006F"/>
+                </a:solidFill>
+                <a:latin typeface="Open Sans" panose="020B0606030504020204" pitchFamily="34" charset="0"/>
+                <a:ea typeface="Open Sans" panose="020B0606030504020204" pitchFamily="34" charset="0"/>
+                <a:cs typeface="Open Sans" panose="020B0606030504020204" pitchFamily="34" charset="0"/>
+              </a:rPr>
+              <a:t>Training: </a:t>
+            </a:r>
+            <a:r>
+              <a:rPr lang="en-US" sz="1800" dirty="0">
+                <a:solidFill>
+                  <a:srgbClr val="000000"/>
+                </a:solidFill>
+                <a:latin typeface="Open Sans" panose="020B0606030504020204" pitchFamily="34" charset="0"/>
+                <a:ea typeface="Open Sans" panose="020B0606030504020204" pitchFamily="34" charset="0"/>
+                <a:cs typeface="Open Sans" panose="020B0606030504020204" pitchFamily="34" charset="0"/>
+              </a:rPr>
+              <a:t>Trained for 16 epochs, learning rate of 5e-6, batch size of 677, L2 regularization with coefficient 0.001.</a:t>
+            </a:r>
+          </a:p>
+          <a:p>
+            <a:pPr marL="285750" indent="-285750">
+              <a:buFont typeface="Arial" panose="020B0604020202020204" pitchFamily="34" charset="0"/>
+              <a:buChar char="•"/>
+            </a:pPr>
+            <a:r>
+              <a:rPr lang="en-US" sz="1800" b="1" dirty="0">
+                <a:solidFill>
+                  <a:srgbClr val="33006F"/>
+                </a:solidFill>
+                <a:latin typeface="Open Sans" panose="020B0606030504020204" pitchFamily="34" charset="0"/>
+                <a:ea typeface="Open Sans" panose="020B0606030504020204" pitchFamily="34" charset="0"/>
+                <a:cs typeface="Open Sans" panose="020B0606030504020204" pitchFamily="34" charset="0"/>
+              </a:rPr>
+              <a:t>Loss function and optimizer: </a:t>
+            </a:r>
+            <a:r>
+              <a:rPr lang="en-US" sz="1800" dirty="0">
+                <a:solidFill>
+                  <a:srgbClr val="000000"/>
+                </a:solidFill>
+                <a:latin typeface="Open Sans" panose="020B0606030504020204" pitchFamily="34" charset="0"/>
+                <a:ea typeface="Open Sans" panose="020B0606030504020204" pitchFamily="34" charset="0"/>
+                <a:cs typeface="Open Sans" panose="020B0606030504020204" pitchFamily="34" charset="0"/>
+              </a:rPr>
+              <a:t>Cross-entropy loss function and Adam optimizer.</a:t>
+            </a:r>
+          </a:p>
+        </p:txBody>
+      </p:sp>
       <p:sp>
         <p:nvSpPr>
           <p:cNvPr id="79" name="TextBox 78"/>
@@ -4896,7 +5525,7 @@
           <p:nvPr/>
         </p:nvPicPr>
         <p:blipFill>
-          <a:blip r:embed="rId5">
+          <a:blip r:embed="rId4">
             <a:extLst>
               <a:ext uri="{28A0092B-C50C-407E-A947-70E740481C1C}">
                 <a14:useLocalDpi xmlns:a14="http://schemas.microsoft.com/office/drawing/2010/main" val="0"/>
@@ -4932,7 +5561,7 @@
           <p:nvPr/>
         </p:nvPicPr>
         <p:blipFill rotWithShape="1">
-          <a:blip r:embed="rId6"/>
+          <a:blip r:embed="rId5"/>
           <a:srcRect b="2454"/>
           <a:stretch/>
         </p:blipFill>
@@ -4961,15 +5590,15 @@
           <p:nvPr/>
         </p:nvPicPr>
         <p:blipFill>
-          <a:blip r:embed="rId7"/>
+          <a:blip r:embed="rId6"/>
           <a:stretch>
             <a:fillRect/>
           </a:stretch>
         </p:blipFill>
         <p:spPr>
           <a:xfrm>
-            <a:off x="731519" y="11521440"/>
-            <a:ext cx="6309360" cy="4206240"/>
+            <a:off x="16550640" y="1828800"/>
+            <a:ext cx="4114800" cy="2743200"/>
           </a:xfrm>
           <a:prstGeom prst="rect">
             <a:avLst/>
@@ -4991,63 +5620,21 @@
           <p:nvPr/>
         </p:nvPicPr>
         <p:blipFill>
-          <a:blip r:embed="rId8"/>
+          <a:blip r:embed="rId7"/>
           <a:stretch>
             <a:fillRect/>
           </a:stretch>
         </p:blipFill>
         <p:spPr>
           <a:xfrm>
-            <a:off x="1152137" y="16733520"/>
-            <a:ext cx="5468123" cy="3591944"/>
+            <a:off x="457200" y="11978640"/>
+            <a:ext cx="6400800" cy="4204608"/>
           </a:xfrm>
           <a:prstGeom prst="rect">
             <a:avLst/>
           </a:prstGeom>
         </p:spPr>
       </p:pic>
-      <p:sp>
-        <p:nvSpPr>
-          <p:cNvPr id="10" name="TextBox 9">
-            <a:extLst>
-              <a:ext uri="{FF2B5EF4-FFF2-40B4-BE49-F238E27FC236}">
-                <a16:creationId xmlns:a16="http://schemas.microsoft.com/office/drawing/2014/main" id="{78D6CC88-F298-538B-DDB2-F7DD2DB706CA}"/>
-              </a:ext>
-            </a:extLst>
-          </p:cNvPr>
-          <p:cNvSpPr txBox="1"/>
-          <p:nvPr/>
-        </p:nvSpPr>
-        <p:spPr>
-          <a:xfrm>
-            <a:off x="1152137" y="15819120"/>
-            <a:ext cx="5468123" cy="584775"/>
-          </a:xfrm>
-          <a:prstGeom prst="rect">
-            <a:avLst/>
-          </a:prstGeom>
-          <a:noFill/>
-        </p:spPr>
-        <p:txBody>
-          <a:bodyPr wrap="square" rtlCol="0">
-            <a:spAutoFit/>
-          </a:bodyPr>
-          <a:lstStyle/>
-          <a:p>
-            <a:r>
-              <a:rPr lang="en-US" sz="1600" i="1" dirty="0">
-                <a:solidFill>
-                  <a:srgbClr val="33006F"/>
-                </a:solidFill>
-                <a:latin typeface="Open Sans" panose="020B0606030504020204" pitchFamily="34" charset="0"/>
-                <a:ea typeface="Open Sans" panose="020B0606030504020204" pitchFamily="34" charset="0"/>
-                <a:cs typeface="Open Sans" panose="020B0606030504020204" pitchFamily="34" charset="0"/>
-              </a:rPr>
-              <a:t>Snapshot from artist’s rendition of binary black hole merger.</a:t>
-            </a:r>
-          </a:p>
-        </p:txBody>
-      </p:sp>
       <p:sp>
         <p:nvSpPr>
           <p:cNvPr id="13" name="TextBox 12">
@@ -5062,8 +5649,8 @@
         </p:nvSpPr>
         <p:spPr>
           <a:xfrm>
-            <a:off x="1152640" y="20391120"/>
-            <a:ext cx="5467618" cy="307777"/>
+            <a:off x="1828800" y="16276320"/>
+            <a:ext cx="3657600" cy="274320"/>
           </a:xfrm>
           <a:prstGeom prst="rect">
             <a:avLst/>
@@ -5105,7 +5692,7 @@
           <p:nvPr/>
         </p:nvPicPr>
         <p:blipFill rotWithShape="1">
-          <a:blip r:embed="rId9">
+          <a:blip r:embed="rId8">
             <a:extLst>
               <a:ext uri="{28A0092B-C50C-407E-A947-70E740481C1C}">
                 <a14:useLocalDpi xmlns:a14="http://schemas.microsoft.com/office/drawing/2010/main" val="0"/>
@@ -5117,8 +5704,8 @@
         </p:blipFill>
         <p:spPr bwMode="auto">
           <a:xfrm>
-            <a:off x="514665" y="30175200"/>
-            <a:ext cx="6636877" cy="1447800"/>
+            <a:off x="457200" y="24963120"/>
+            <a:ext cx="6400800" cy="1396301"/>
           </a:xfrm>
           <a:prstGeom prst="rect">
             <a:avLst/>
@@ -5192,7 +5779,7 @@
           <p:nvPr/>
         </p:nvPicPr>
         <p:blipFill>
-          <a:blip r:embed="rId10"/>
+          <a:blip r:embed="rId9"/>
           <a:stretch>
             <a:fillRect/>
           </a:stretch>
@@ -5222,7 +5809,7 @@
           <p:nvPr/>
         </p:nvPicPr>
         <p:blipFill>
-          <a:blip r:embed="rId11"/>
+          <a:blip r:embed="rId10"/>
           <a:stretch>
             <a:fillRect/>
           </a:stretch>
@@ -5251,8 +5838,8 @@
         </p:nvSpPr>
         <p:spPr>
           <a:xfrm>
-            <a:off x="6921501" y="32037457"/>
-            <a:ext cx="14592299" cy="523220"/>
+            <a:off x="457200" y="32186880"/>
+            <a:ext cx="14592299" cy="457200"/>
           </a:xfrm>
           <a:prstGeom prst="rect">
             <a:avLst/>
@@ -5324,6 +5911,125 @@
                 <a:cs typeface="Open Sans" panose="020B0606030504020204" pitchFamily="34" charset="0"/>
               </a:rPr>
               <a:t> E.A. (2018). Glitch Classification and Clustering for LIGO with Deep Transfer Learning. Phys Rev. D 97, 101501. arXiv:1711.07468v2 [astro-ph.IM].</a:t>
+            </a:r>
+          </a:p>
+        </p:txBody>
+      </p:sp>
+      <p:sp>
+        <p:nvSpPr>
+          <p:cNvPr id="16" name="TextBox 15">
+            <a:extLst>
+              <a:ext uri="{FF2B5EF4-FFF2-40B4-BE49-F238E27FC236}">
+                <a16:creationId xmlns:a16="http://schemas.microsoft.com/office/drawing/2014/main" id="{C7CF0131-F6B5-D94D-303A-4051FB66301B}"/>
+              </a:ext>
+            </a:extLst>
+          </p:cNvPr>
+          <p:cNvSpPr txBox="1"/>
+          <p:nvPr/>
+        </p:nvSpPr>
+        <p:spPr>
+          <a:xfrm>
+            <a:off x="11521440" y="5120640"/>
+            <a:ext cx="9144000" cy="914400"/>
+          </a:xfrm>
+          <a:prstGeom prst="rect">
+            <a:avLst/>
+          </a:prstGeom>
+          <a:noFill/>
+        </p:spPr>
+        <p:txBody>
+          <a:bodyPr wrap="square" rtlCol="0">
+            <a:spAutoFit/>
+          </a:bodyPr>
+          <a:lstStyle/>
+          <a:p>
+            <a:pPr algn="r"/>
+            <a:r>
+              <a:rPr lang="en-US" sz="3000" dirty="0">
+                <a:solidFill>
+                  <a:srgbClr val="FFFFFF"/>
+                </a:solidFill>
+                <a:latin typeface="Open Sans" charset="0"/>
+                <a:ea typeface="Open Sans" charset="0"/>
+                <a:cs typeface="Open Sans" charset="0"/>
+              </a:rPr>
+              <a:t>Physics 417 Poster Session @ eScience Institute </a:t>
+            </a:r>
+          </a:p>
+          <a:p>
+            <a:pPr algn="r"/>
+            <a:r>
+              <a:rPr lang="en-US" sz="3000" i="1" dirty="0">
+                <a:solidFill>
+                  <a:srgbClr val="FFFFFF"/>
+                </a:solidFill>
+                <a:latin typeface="Open Sans" charset="0"/>
+                <a:ea typeface="Open Sans" charset="0"/>
+                <a:cs typeface="Open Sans" charset="0"/>
+              </a:rPr>
+              <a:t>June 1, 2023 </a:t>
+            </a:r>
+            <a:endParaRPr lang="en-US" sz="2400" i="1" dirty="0">
+              <a:solidFill>
+                <a:srgbClr val="FFFFFF"/>
+              </a:solidFill>
+              <a:latin typeface="Open Sans" charset="0"/>
+              <a:ea typeface="Open Sans" charset="0"/>
+              <a:cs typeface="Open Sans" charset="0"/>
+            </a:endParaRPr>
+          </a:p>
+          <a:p>
+            <a:pPr algn="r"/>
+            <a:endParaRPr lang="en-US" sz="3000" dirty="0">
+              <a:solidFill>
+                <a:srgbClr val="FFFFFF"/>
+              </a:solidFill>
+              <a:latin typeface="Open Sans" charset="0"/>
+              <a:ea typeface="Open Sans" charset="0"/>
+              <a:cs typeface="Open Sans" charset="0"/>
+            </a:endParaRPr>
+          </a:p>
+        </p:txBody>
+      </p:sp>
+      <p:sp>
+        <p:nvSpPr>
+          <p:cNvPr id="18" name="TextBox 17">
+            <a:extLst>
+              <a:ext uri="{FF2B5EF4-FFF2-40B4-BE49-F238E27FC236}">
+                <a16:creationId xmlns:a16="http://schemas.microsoft.com/office/drawing/2014/main" id="{BB4BC641-A958-F54B-F29A-17BADF6457FF}"/>
+              </a:ext>
+            </a:extLst>
+          </p:cNvPr>
+          <p:cNvSpPr txBox="1"/>
+          <p:nvPr/>
+        </p:nvSpPr>
+        <p:spPr>
+          <a:xfrm>
+            <a:off x="16184880" y="4663440"/>
+            <a:ext cx="4572000" cy="274320"/>
+          </a:xfrm>
+          <a:prstGeom prst="rect">
+            <a:avLst/>
+          </a:prstGeom>
+          <a:noFill/>
+        </p:spPr>
+        <p:txBody>
+          <a:bodyPr wrap="square" rtlCol="0">
+            <a:spAutoFit/>
+          </a:bodyPr>
+          <a:lstStyle/>
+          <a:p>
+            <a:pPr algn="r"/>
+            <a:r>
+              <a:rPr lang="en-US" sz="1600" i="1" dirty="0">
+                <a:solidFill>
+                  <a:srgbClr val="FFFFFF"/>
+                </a:solidFill>
+                <a:latin typeface="Open Sans" panose="020B0606030504020204" pitchFamily="34" charset="0"/>
+                <a:ea typeface="Open Sans" panose="020B0606030504020204" pitchFamily="34" charset="0"/>
+                <a:cs typeface="Open Sans" panose="020B0606030504020204" pitchFamily="34" charset="0"/>
+              </a:rPr>
+              <a:t>Artist’s rendition of binary black hole merger.</a:t>
             </a:r>
           </a:p>
         </p:txBody>

</xml_diff>

<commit_message>
Final changes, ready for printing
</commit_message>
<xml_diff>
--- a/Poster/GW Glitch UW poster.pptx
+++ b/Poster/GW Glitch UW poster.pptx
@@ -296,7 +296,7 @@
               <a:rPr lang="en-US" smtClean="0"/>
               <a:t>5/30/2023</a:t>
             </a:fld>
-            <a:endParaRPr lang="en-US"/>
+            <a:endParaRPr lang="en-US" dirty="0"/>
           </a:p>
         </p:txBody>
       </p:sp>
@@ -315,7 +315,7 @@
           <a:bodyPr/>
           <a:lstStyle/>
           <a:p>
-            <a:endParaRPr lang="en-US"/>
+            <a:endParaRPr lang="en-US" dirty="0"/>
           </a:p>
         </p:txBody>
       </p:sp>
@@ -338,7 +338,7 @@
               <a:rPr lang="en-US" smtClean="0"/>
               <a:t>‹#›</a:t>
             </a:fld>
-            <a:endParaRPr lang="en-US"/>
+            <a:endParaRPr lang="en-US" dirty="0"/>
           </a:p>
         </p:txBody>
       </p:sp>
@@ -461,7 +461,7 @@
               <a:rPr lang="en-US" smtClean="0"/>
               <a:t>5/30/2023</a:t>
             </a:fld>
-            <a:endParaRPr lang="en-US"/>
+            <a:endParaRPr lang="en-US" dirty="0"/>
           </a:p>
         </p:txBody>
       </p:sp>
@@ -480,7 +480,7 @@
           <a:bodyPr/>
           <a:lstStyle/>
           <a:p>
-            <a:endParaRPr lang="en-US"/>
+            <a:endParaRPr lang="en-US" dirty="0"/>
           </a:p>
         </p:txBody>
       </p:sp>
@@ -503,7 +503,7 @@
               <a:rPr lang="en-US" smtClean="0"/>
               <a:t>‹#›</a:t>
             </a:fld>
-            <a:endParaRPr lang="en-US"/>
+            <a:endParaRPr lang="en-US" dirty="0"/>
           </a:p>
         </p:txBody>
       </p:sp>
@@ -636,7 +636,7 @@
               <a:rPr lang="en-US" smtClean="0"/>
               <a:t>5/30/2023</a:t>
             </a:fld>
-            <a:endParaRPr lang="en-US"/>
+            <a:endParaRPr lang="en-US" dirty="0"/>
           </a:p>
         </p:txBody>
       </p:sp>
@@ -655,7 +655,7 @@
           <a:bodyPr/>
           <a:lstStyle/>
           <a:p>
-            <a:endParaRPr lang="en-US"/>
+            <a:endParaRPr lang="en-US" dirty="0"/>
           </a:p>
         </p:txBody>
       </p:sp>
@@ -678,7 +678,7 @@
               <a:rPr lang="en-US" smtClean="0"/>
               <a:t>‹#›</a:t>
             </a:fld>
-            <a:endParaRPr lang="en-US"/>
+            <a:endParaRPr lang="en-US" dirty="0"/>
           </a:p>
         </p:txBody>
       </p:sp>
@@ -801,7 +801,7 @@
               <a:rPr lang="en-US" smtClean="0"/>
               <a:t>5/30/2023</a:t>
             </a:fld>
-            <a:endParaRPr lang="en-US"/>
+            <a:endParaRPr lang="en-US" dirty="0"/>
           </a:p>
         </p:txBody>
       </p:sp>
@@ -820,7 +820,7 @@
           <a:bodyPr/>
           <a:lstStyle/>
           <a:p>
-            <a:endParaRPr lang="en-US"/>
+            <a:endParaRPr lang="en-US" dirty="0"/>
           </a:p>
         </p:txBody>
       </p:sp>
@@ -843,7 +843,7 @@
               <a:rPr lang="en-US" smtClean="0"/>
               <a:t>‹#›</a:t>
             </a:fld>
-            <a:endParaRPr lang="en-US"/>
+            <a:endParaRPr lang="en-US" dirty="0"/>
           </a:p>
         </p:txBody>
       </p:sp>
@@ -1040,7 +1040,7 @@
               <a:rPr lang="en-US" smtClean="0"/>
               <a:t>5/30/2023</a:t>
             </a:fld>
-            <a:endParaRPr lang="en-US"/>
+            <a:endParaRPr lang="en-US" dirty="0"/>
           </a:p>
         </p:txBody>
       </p:sp>
@@ -1059,7 +1059,7 @@
           <a:bodyPr/>
           <a:lstStyle/>
           <a:p>
-            <a:endParaRPr lang="en-US"/>
+            <a:endParaRPr lang="en-US" dirty="0"/>
           </a:p>
         </p:txBody>
       </p:sp>
@@ -1082,7 +1082,7 @@
               <a:rPr lang="en-US" smtClean="0"/>
               <a:t>‹#›</a:t>
             </a:fld>
-            <a:endParaRPr lang="en-US"/>
+            <a:endParaRPr lang="en-US" dirty="0"/>
           </a:p>
         </p:txBody>
       </p:sp>
@@ -1267,7 +1267,7 @@
               <a:rPr lang="en-US" smtClean="0"/>
               <a:t>5/30/2023</a:t>
             </a:fld>
-            <a:endParaRPr lang="en-US"/>
+            <a:endParaRPr lang="en-US" dirty="0"/>
           </a:p>
         </p:txBody>
       </p:sp>
@@ -1286,7 +1286,7 @@
           <a:bodyPr/>
           <a:lstStyle/>
           <a:p>
-            <a:endParaRPr lang="en-US"/>
+            <a:endParaRPr lang="en-US" dirty="0"/>
           </a:p>
         </p:txBody>
       </p:sp>
@@ -1309,7 +1309,7 @@
               <a:rPr lang="en-US" smtClean="0"/>
               <a:t>‹#›</a:t>
             </a:fld>
-            <a:endParaRPr lang="en-US"/>
+            <a:endParaRPr lang="en-US" dirty="0"/>
           </a:p>
         </p:txBody>
       </p:sp>
@@ -1629,7 +1629,7 @@
               <a:rPr lang="en-US" smtClean="0"/>
               <a:t>5/30/2023</a:t>
             </a:fld>
-            <a:endParaRPr lang="en-US"/>
+            <a:endParaRPr lang="en-US" dirty="0"/>
           </a:p>
         </p:txBody>
       </p:sp>
@@ -1648,7 +1648,7 @@
           <a:bodyPr/>
           <a:lstStyle/>
           <a:p>
-            <a:endParaRPr lang="en-US"/>
+            <a:endParaRPr lang="en-US" dirty="0"/>
           </a:p>
         </p:txBody>
       </p:sp>
@@ -1671,7 +1671,7 @@
               <a:rPr lang="en-US" smtClean="0"/>
               <a:t>‹#›</a:t>
             </a:fld>
-            <a:endParaRPr lang="en-US"/>
+            <a:endParaRPr lang="en-US" dirty="0"/>
           </a:p>
         </p:txBody>
       </p:sp>
@@ -1742,7 +1742,7 @@
               <a:rPr lang="en-US" smtClean="0"/>
               <a:t>5/30/2023</a:t>
             </a:fld>
-            <a:endParaRPr lang="en-US"/>
+            <a:endParaRPr lang="en-US" dirty="0"/>
           </a:p>
         </p:txBody>
       </p:sp>
@@ -1761,7 +1761,7 @@
           <a:bodyPr/>
           <a:lstStyle/>
           <a:p>
-            <a:endParaRPr lang="en-US"/>
+            <a:endParaRPr lang="en-US" dirty="0"/>
           </a:p>
         </p:txBody>
       </p:sp>
@@ -1784,7 +1784,7 @@
               <a:rPr lang="en-US" smtClean="0"/>
               <a:t>‹#›</a:t>
             </a:fld>
-            <a:endParaRPr lang="en-US"/>
+            <a:endParaRPr lang="en-US" dirty="0"/>
           </a:p>
         </p:txBody>
       </p:sp>
@@ -1832,7 +1832,7 @@
               <a:rPr lang="en-US" smtClean="0"/>
               <a:t>5/30/2023</a:t>
             </a:fld>
-            <a:endParaRPr lang="en-US"/>
+            <a:endParaRPr lang="en-US" dirty="0"/>
           </a:p>
         </p:txBody>
       </p:sp>
@@ -1851,7 +1851,7 @@
           <a:bodyPr/>
           <a:lstStyle/>
           <a:p>
-            <a:endParaRPr lang="en-US"/>
+            <a:endParaRPr lang="en-US" dirty="0"/>
           </a:p>
         </p:txBody>
       </p:sp>
@@ -1874,7 +1874,7 @@
               <a:rPr lang="en-US" smtClean="0"/>
               <a:t>‹#›</a:t>
             </a:fld>
-            <a:endParaRPr lang="en-US"/>
+            <a:endParaRPr lang="en-US" dirty="0"/>
           </a:p>
         </p:txBody>
       </p:sp>
@@ -2104,7 +2104,7 @@
               <a:rPr lang="en-US" smtClean="0"/>
               <a:t>5/30/2023</a:t>
             </a:fld>
-            <a:endParaRPr lang="en-US"/>
+            <a:endParaRPr lang="en-US" dirty="0"/>
           </a:p>
         </p:txBody>
       </p:sp>
@@ -2123,7 +2123,7 @@
           <a:bodyPr/>
           <a:lstStyle/>
           <a:p>
-            <a:endParaRPr lang="en-US"/>
+            <a:endParaRPr lang="en-US" dirty="0"/>
           </a:p>
         </p:txBody>
       </p:sp>
@@ -2146,7 +2146,7 @@
               <a:rPr lang="en-US" smtClean="0"/>
               <a:t>‹#›</a:t>
             </a:fld>
-            <a:endParaRPr lang="en-US"/>
+            <a:endParaRPr lang="en-US" dirty="0"/>
           </a:p>
         </p:txBody>
       </p:sp>
@@ -2265,10 +2265,9 @@
           </a:lstStyle>
           <a:p>
             <a:r>
-              <a:rPr lang="en-US"/>
+              <a:rPr lang="en-US" dirty="0"/>
               <a:t>Drag picture to placeholder or click icon to add</a:t>
             </a:r>
-            <a:endParaRPr lang="en-US" dirty="0"/>
           </a:p>
         </p:txBody>
       </p:sp>
@@ -2356,7 +2355,7 @@
               <a:rPr lang="en-US" smtClean="0"/>
               <a:t>5/30/2023</a:t>
             </a:fld>
-            <a:endParaRPr lang="en-US"/>
+            <a:endParaRPr lang="en-US" dirty="0"/>
           </a:p>
         </p:txBody>
       </p:sp>
@@ -2375,7 +2374,7 @@
           <a:bodyPr/>
           <a:lstStyle/>
           <a:p>
-            <a:endParaRPr lang="en-US"/>
+            <a:endParaRPr lang="en-US" dirty="0"/>
           </a:p>
         </p:txBody>
       </p:sp>
@@ -2398,7 +2397,7 @@
               <a:rPr lang="en-US" smtClean="0"/>
               <a:t>‹#›</a:t>
             </a:fld>
-            <a:endParaRPr lang="en-US"/>
+            <a:endParaRPr lang="en-US" dirty="0"/>
           </a:p>
         </p:txBody>
       </p:sp>
@@ -2564,7 +2563,7 @@
               <a:rPr lang="en-US" smtClean="0"/>
               <a:t>5/30/2023</a:t>
             </a:fld>
-            <a:endParaRPr lang="en-US"/>
+            <a:endParaRPr lang="en-US" dirty="0"/>
           </a:p>
         </p:txBody>
       </p:sp>
@@ -2601,7 +2600,7 @@
             </a:lvl1pPr>
           </a:lstStyle>
           <a:p>
-            <a:endParaRPr lang="en-US"/>
+            <a:endParaRPr lang="en-US" dirty="0"/>
           </a:p>
         </p:txBody>
       </p:sp>
@@ -2642,7 +2641,7 @@
               <a:rPr lang="en-US" smtClean="0"/>
               <a:t>‹#›</a:t>
             </a:fld>
-            <a:endParaRPr lang="en-US"/>
+            <a:endParaRPr lang="en-US" dirty="0"/>
           </a:p>
         </p:txBody>
       </p:sp>
@@ -3019,7 +3018,7 @@
           <a:lstStyle/>
           <a:p>
             <a:pPr algn="ctr"/>
-            <a:endParaRPr lang="en-US" sz="4800"/>
+            <a:endParaRPr lang="en-US" sz="4800" dirty="0"/>
           </a:p>
         </p:txBody>
       </p:sp>
@@ -3392,7 +3391,7 @@
                 <a:ea typeface="Open Sans" panose="020B0606030504020204" pitchFamily="34" charset="0"/>
                 <a:cs typeface="Open Sans" panose="020B0606030504020204" pitchFamily="34" charset="0"/>
               </a:rPr>
-              <a:t>Training loss of about 0.1 and validation accuracy near 96% after 16 epochs and over 2400 iterations.</a:t>
+              <a:t>After 16 epochs and over 2400 iterations, training loss reached 0.1, while the validation accuracy approached 96%.</a:t>
             </a:r>
           </a:p>
           <a:p>
@@ -3422,7 +3421,7 @@
                 <a:ea typeface="Open Sans" panose="020B0606030504020204" pitchFamily="34" charset="0"/>
                 <a:cs typeface="Open Sans" panose="020B0606030504020204" pitchFamily="34" charset="0"/>
               </a:rPr>
-              <a:t>CNN model achieved a respectable accuracy of 97% on the testing dataset.</a:t>
+              <a:t>CNN model demonstrated an exceptional accuracy of 97% when evaluated on the testing dataset.</a:t>
             </a:r>
           </a:p>
           <a:p>
@@ -3503,7 +3502,7 @@
               <a:t>Image conversion: </a:t>
             </a:r>
             <a:r>
-              <a:rPr lang="en-US" sz="2000" b="0" i="0" u="none" strike="noStrike" dirty="0" err="1">
+              <a:rPr lang="en-US" sz="2000" b="0" i="0" u="none" strike="noStrike" dirty="0">
                 <a:solidFill>
                   <a:srgbClr val="000000"/>
                 </a:solidFill>
@@ -3512,19 +3511,7 @@
                 <a:ea typeface="Open Sans" panose="020B0606030504020204" pitchFamily="34" charset="0"/>
                 <a:cs typeface="Open Sans" panose="020B0606030504020204" pitchFamily="34" charset="0"/>
               </a:rPr>
-              <a:t>Gramian</a:t>
-            </a:r>
-            <a:r>
-              <a:rPr lang="en-US" sz="2000" b="0" i="0" u="none" strike="noStrike" dirty="0">
-                <a:solidFill>
-                  <a:srgbClr val="000000"/>
-                </a:solidFill>
-                <a:effectLst/>
-                <a:latin typeface="Open Sans" panose="020B0606030504020204" pitchFamily="34" charset="0"/>
-                <a:ea typeface="Open Sans" panose="020B0606030504020204" pitchFamily="34" charset="0"/>
-                <a:cs typeface="Open Sans" panose="020B0606030504020204" pitchFamily="34" charset="0"/>
-              </a:rPr>
-              <a:t> Angular Summation Fields were effective for image conversion in our case, while others found Fourier transforms more suitable for handling complex noise and background through frequency domain filtering.</a:t>
+              <a:t>Gramian Angular Summation Fields were effective for image conversion in our case, while others found Fourier transforms more suitable for handling complex noise and background through frequency domain filtering.</a:t>
             </a:r>
           </a:p>
         </p:txBody>
@@ -3616,7 +3603,7 @@
         <p:spPr>
           <a:xfrm>
             <a:off x="15087600" y="23134320"/>
-            <a:ext cx="6400800" cy="4663440"/>
+            <a:ext cx="6400800" cy="5016758"/>
           </a:xfrm>
           <a:prstGeom prst="rect">
             <a:avLst/>
@@ -3655,8 +3642,28 @@
                 <a:ea typeface="Open Sans" panose="020B0606030504020204" pitchFamily="34" charset="0"/>
                 <a:cs typeface="Open Sans" panose="020B0606030504020204" pitchFamily="34" charset="0"/>
               </a:rPr>
-              <a:t>Analyzing the potential of CNNs for classifying gravitational waves strain data as background noise/glitches or transient sine-gaussian/binary mergers.</a:t>
-            </a:r>
+              <a:t>Analyzing the potential of CNNs for classifying gravitational waves strain data as background noise/glitches or transient sine-gaussian/binary black hole merger</a:t>
+            </a:r>
+            <a:r>
+              <a:rPr lang="en-US" sz="2000" dirty="0">
+                <a:solidFill>
+                  <a:srgbClr val="000000"/>
+                </a:solidFill>
+                <a:latin typeface="Open Sans" panose="020B0606030504020204" pitchFamily="34" charset="0"/>
+                <a:ea typeface="Open Sans" panose="020B0606030504020204" pitchFamily="34" charset="0"/>
+                <a:cs typeface="Open Sans" panose="020B0606030504020204" pitchFamily="34" charset="0"/>
+              </a:rPr>
+              <a:t> signals.</a:t>
+            </a:r>
+            <a:endParaRPr lang="en-US" sz="2000" b="0" i="0" u="none" strike="noStrike" dirty="0">
+              <a:solidFill>
+                <a:srgbClr val="000000"/>
+              </a:solidFill>
+              <a:effectLst/>
+              <a:latin typeface="Open Sans" panose="020B0606030504020204" pitchFamily="34" charset="0"/>
+              <a:ea typeface="Open Sans" panose="020B0606030504020204" pitchFamily="34" charset="0"/>
+              <a:cs typeface="Open Sans" panose="020B0606030504020204" pitchFamily="34" charset="0"/>
+            </a:endParaRPr>
           </a:p>
           <a:p>
             <a:pPr marL="285750" indent="-285750">
@@ -3685,7 +3692,7 @@
                 <a:ea typeface="Open Sans" panose="020B0606030504020204" pitchFamily="34" charset="0"/>
                 <a:cs typeface="Open Sans" panose="020B0606030504020204" pitchFamily="34" charset="0"/>
               </a:rPr>
-              <a:t>Utilized a simplified version of common approaches in the literature.</a:t>
+              <a:t>Utilized a streamlined variation of a CNN based upon versions existing in literature.</a:t>
             </a:r>
           </a:p>
           <a:p>
@@ -3715,7 +3722,7 @@
                 <a:ea typeface="Open Sans" panose="020B0606030504020204" pitchFamily="34" charset="0"/>
                 <a:cs typeface="Open Sans" panose="020B0606030504020204" pitchFamily="34" charset="0"/>
               </a:rPr>
-              <a:t>Surpassed expectations by achieving an accuracy of 97%.</a:t>
+              <a:t>Exceeded the anticipated 85% accuracy by attaining an impressive testing accuracy of 97%.</a:t>
             </a:r>
           </a:p>
           <a:p>
@@ -3745,7 +3752,7 @@
                 <a:ea typeface="Open Sans" panose="020B0606030504020204" pitchFamily="34" charset="0"/>
                 <a:cs typeface="Open Sans" panose="020B0606030504020204" pitchFamily="34" charset="0"/>
               </a:rPr>
-              <a:t>Achieved accuracy slightly below more complex CNNs used for comparison.</a:t>
+              <a:t>Achieved accuracy slightly below more complex CNNs documented in literature.</a:t>
             </a:r>
           </a:p>
           <a:p>
@@ -3775,31 +3782,7 @@
                 <a:ea typeface="Open Sans" panose="020B0606030504020204" pitchFamily="34" charset="0"/>
                 <a:cs typeface="Open Sans" panose="020B0606030504020204" pitchFamily="34" charset="0"/>
               </a:rPr>
-              <a:t>Investigating the effectiveness of the </a:t>
-            </a:r>
-            <a:r>
-              <a:rPr lang="en-US" sz="2000" b="0" i="0" u="none" strike="noStrike" dirty="0" err="1">
-                <a:solidFill>
-                  <a:srgbClr val="000000"/>
-                </a:solidFill>
-                <a:effectLst/>
-                <a:latin typeface="Open Sans" panose="020B0606030504020204" pitchFamily="34" charset="0"/>
-                <a:ea typeface="Open Sans" panose="020B0606030504020204" pitchFamily="34" charset="0"/>
-                <a:cs typeface="Open Sans" panose="020B0606030504020204" pitchFamily="34" charset="0"/>
-              </a:rPr>
-              <a:t>Gramian</a:t>
-            </a:r>
-            <a:r>
-              <a:rPr lang="en-US" sz="2000" b="0" i="0" u="none" strike="noStrike" dirty="0">
-                <a:solidFill>
-                  <a:srgbClr val="000000"/>
-                </a:solidFill>
-                <a:effectLst/>
-                <a:latin typeface="Open Sans" panose="020B0606030504020204" pitchFamily="34" charset="0"/>
-                <a:ea typeface="Open Sans" panose="020B0606030504020204" pitchFamily="34" charset="0"/>
-                <a:cs typeface="Open Sans" panose="020B0606030504020204" pitchFamily="34" charset="0"/>
-              </a:rPr>
-              <a:t> Angular Summation Field approach for converting time series to images and passing them through a simple CNN on more realistic data.</a:t>
+              <a:t>Examining the efficacy of the GASF technique in transforming time series data into images and feeding them through a basic CNN, by using a dataset of more contaminated gravitational waves for analysis.</a:t>
             </a:r>
           </a:p>
         </p:txBody>
@@ -3840,7 +3823,7 @@
           <a:lstStyle/>
           <a:p>
             <a:pPr algn="ctr"/>
-            <a:endParaRPr lang="en-US"/>
+            <a:endParaRPr lang="en-US" dirty="0"/>
           </a:p>
         </p:txBody>
       </p:sp>
@@ -4077,7 +4060,7 @@
                 <a:ea typeface="Open Sans" panose="020B0606030504020204" pitchFamily="34" charset="0"/>
                 <a:cs typeface="Open Sans" panose="020B0606030504020204" pitchFamily="34" charset="0"/>
               </a:rPr>
-              <a:t>gravitational wave time series</a:t>
+              <a:t>gravitational wave time series data points</a:t>
             </a:r>
             <a:endParaRPr lang="en-US" sz="2200" b="0" dirty="0">
               <a:solidFill>
@@ -4118,7 +4101,7 @@
               <a:t>Applied </a:t>
             </a:r>
             <a:r>
-              <a:rPr lang="en-US" sz="2200" b="1" dirty="0" err="1">
+              <a:rPr lang="en-US" sz="2200" b="1" dirty="0">
                 <a:solidFill>
                   <a:srgbClr val="FFFFFF"/>
                 </a:solidFill>
@@ -4126,18 +4109,7 @@
                 <a:ea typeface="Open Sans" panose="020B0606030504020204" pitchFamily="34" charset="0"/>
                 <a:cs typeface="Open Sans" panose="020B0606030504020204" pitchFamily="34" charset="0"/>
               </a:rPr>
-              <a:t>Gramian</a:t>
-            </a:r>
-            <a:r>
-              <a:rPr lang="en-US" sz="2200" b="1" dirty="0">
-                <a:solidFill>
-                  <a:srgbClr val="FFFFFF"/>
-                </a:solidFill>
-                <a:latin typeface="Open Sans" panose="020B0606030504020204" pitchFamily="34" charset="0"/>
-                <a:ea typeface="Open Sans" panose="020B0606030504020204" pitchFamily="34" charset="0"/>
-                <a:cs typeface="Open Sans" panose="020B0606030504020204" pitchFamily="34" charset="0"/>
-              </a:rPr>
-              <a:t> Angular Summation Field</a:t>
+              <a:t>Gramian Angular Summation Field</a:t>
             </a:r>
             <a:r>
               <a:rPr lang="en-US" sz="2200" dirty="0">
@@ -4177,7 +4149,7 @@
                 <a:ea typeface="Open Sans" panose="020B0606030504020204" pitchFamily="34" charset="0"/>
                 <a:cs typeface="Open Sans" panose="020B0606030504020204" pitchFamily="34" charset="0"/>
               </a:rPr>
-              <a:t> Neural network consisted of </a:t>
+              <a:t> Neural network contains </a:t>
             </a:r>
             <a:r>
               <a:rPr lang="en-US" sz="2200" b="1" dirty="0">
@@ -4199,7 +4171,7 @@
                 <a:ea typeface="Open Sans" panose="020B0606030504020204" pitchFamily="34" charset="0"/>
                 <a:cs typeface="Open Sans" panose="020B0606030504020204" pitchFamily="34" charset="0"/>
               </a:rPr>
-              <a:t> convolutional / pooling layers followed by </a:t>
+              <a:t> convolutional / max-pooling layers followed by </a:t>
             </a:r>
             <a:r>
               <a:rPr lang="en-US" sz="2200" b="1" dirty="0">
@@ -4348,7 +4320,7 @@
               <a:t> and </a:t>
             </a:r>
             <a:r>
-              <a:rPr lang="en-US" sz="2200" b="1" dirty="0" err="1">
+              <a:rPr lang="en-US" sz="2200" b="1" dirty="0">
                 <a:solidFill>
                   <a:srgbClr val="FFFFFF"/>
                 </a:solidFill>
@@ -4539,31 +4511,7 @@
                 <a:ea typeface="Open Sans" panose="020B0606030504020204" pitchFamily="34" charset="0"/>
                 <a:cs typeface="Open Sans" panose="020B0606030504020204" pitchFamily="34" charset="0"/>
               </a:rPr>
-              <a:t>Utilized the </a:t>
-            </a:r>
-            <a:r>
-              <a:rPr lang="en-US" sz="2000" b="0" i="0" u="none" strike="noStrike" dirty="0" err="1">
-                <a:solidFill>
-                  <a:srgbClr val="000000"/>
-                </a:solidFill>
-                <a:effectLst/>
-                <a:latin typeface="Open Sans" panose="020B0606030504020204" pitchFamily="34" charset="0"/>
-                <a:ea typeface="Open Sans" panose="020B0606030504020204" pitchFamily="34" charset="0"/>
-                <a:cs typeface="Open Sans" panose="020B0606030504020204" pitchFamily="34" charset="0"/>
-              </a:rPr>
-              <a:t>StandardScaler</a:t>
-            </a:r>
-            <a:r>
-              <a:rPr lang="en-US" sz="2000" b="0" i="0" u="none" strike="noStrike" dirty="0">
-                <a:solidFill>
-                  <a:srgbClr val="000000"/>
-                </a:solidFill>
-                <a:effectLst/>
-                <a:latin typeface="Open Sans" panose="020B0606030504020204" pitchFamily="34" charset="0"/>
-                <a:ea typeface="Open Sans" panose="020B0606030504020204" pitchFamily="34" charset="0"/>
-                <a:cs typeface="Open Sans" panose="020B0606030504020204" pitchFamily="34" charset="0"/>
-              </a:rPr>
-              <a:t> function to ensure data was normalized before conversion to GASF images.</a:t>
+              <a:t>Utilized the StandardScaler function to ensure data was normalized before conversion to GASF images.</a:t>
             </a:r>
           </a:p>
           <a:p>
@@ -4593,31 +4541,7 @@
                 <a:ea typeface="Open Sans" panose="020B0606030504020204" pitchFamily="34" charset="0"/>
                 <a:cs typeface="Open Sans" panose="020B0606030504020204" pitchFamily="34" charset="0"/>
               </a:rPr>
-              <a:t>Probability predictions of images for background or signal compared to ground truth targets with </a:t>
-            </a:r>
-            <a:r>
-              <a:rPr lang="en-US" sz="2000" b="0" i="0" u="none" strike="noStrike" dirty="0" err="1">
-                <a:solidFill>
-                  <a:srgbClr val="000000"/>
-                </a:solidFill>
-                <a:effectLst/>
-                <a:latin typeface="Open Sans" panose="020B0606030504020204" pitchFamily="34" charset="0"/>
-                <a:ea typeface="Open Sans" panose="020B0606030504020204" pitchFamily="34" charset="0"/>
-                <a:cs typeface="Open Sans" panose="020B0606030504020204" pitchFamily="34" charset="0"/>
-              </a:rPr>
-              <a:t>Softmax</a:t>
-            </a:r>
-            <a:r>
-              <a:rPr lang="en-US" sz="2000" b="0" i="0" u="none" strike="noStrike" dirty="0">
-                <a:solidFill>
-                  <a:srgbClr val="000000"/>
-                </a:solidFill>
-                <a:effectLst/>
-                <a:latin typeface="Open Sans" panose="020B0606030504020204" pitchFamily="34" charset="0"/>
-                <a:ea typeface="Open Sans" panose="020B0606030504020204" pitchFamily="34" charset="0"/>
-                <a:cs typeface="Open Sans" panose="020B0606030504020204" pitchFamily="34" charset="0"/>
-              </a:rPr>
-              <a:t> function.</a:t>
+              <a:t>Probability predictions of images for background or signal compared to ground truth targets with Softmax function.</a:t>
             </a:r>
           </a:p>
           <a:p>
@@ -4707,19 +4631,7 @@
                 <a:ea typeface="Open Sans" panose="020B0606030504020204" pitchFamily="34" charset="0"/>
                 <a:cs typeface="Open Sans" panose="020B0606030504020204" pitchFamily="34" charset="0"/>
               </a:rPr>
-              <a:t>In the sample of glitch data below, the model misclassified the GASF image as a signal, despite the Hanford signal being a glitch and Livingston signal being background </a:t>
-            </a:r>
-            <a:r>
-              <a:rPr lang="en-US" sz="2000" i="0" u="none" strike="noStrike">
-                <a:solidFill>
-                  <a:srgbClr val="000000"/>
-                </a:solidFill>
-                <a:effectLst/>
-                <a:latin typeface="Open Sans" panose="020B0606030504020204" pitchFamily="34" charset="0"/>
-                <a:ea typeface="Open Sans" panose="020B0606030504020204" pitchFamily="34" charset="0"/>
-                <a:cs typeface="Open Sans" panose="020B0606030504020204" pitchFamily="34" charset="0"/>
-              </a:rPr>
-              <a:t>noise.</a:t>
+              <a:t>In the sample of glitch data below, the model misclassified the GASF image as a signal, despite the Hanford signal being glitch and Livingston signal being background noise.</a:t>
             </a:r>
           </a:p>
           <a:p>
@@ -4841,7 +4753,7 @@
         <p:spPr>
           <a:xfrm>
             <a:off x="457200" y="8412480"/>
-            <a:ext cx="6400800" cy="4023360"/>
+            <a:ext cx="6400800" cy="4401205"/>
           </a:xfrm>
           <a:prstGeom prst="rect">
             <a:avLst/>
@@ -4954,7 +4866,7 @@
                 <a:ea typeface="Open Sans" panose="020B0606030504020204" pitchFamily="34" charset="0"/>
                 <a:cs typeface="Open Sans" panose="020B0606030504020204" pitchFamily="34" charset="0"/>
               </a:rPr>
-              <a:t>Consists of four distinct data categories - Glitch, Background, Binary Black Hole (BBH), and Sine-Gaussian (SG).</a:t>
+              <a:t>Consists of four distinct data categories - Glitch, Background, Sine-Gaussian (SG), and Binary Black Hole (BBH).</a:t>
             </a:r>
           </a:p>
           <a:p>
@@ -4982,7 +4894,7 @@
                 <a:ea typeface="Open Sans" panose="020B0606030504020204" pitchFamily="34" charset="0"/>
                 <a:cs typeface="Open Sans" panose="020B0606030504020204" pitchFamily="34" charset="0"/>
               </a:rPr>
-              <a:t>Develop a binary classifier to identify signals as either Glitch/Background or Binary Black Hole/Sine-Gaussian.</a:t>
+              <a:t>Develop a binary classifier to identify signals as either Glitch/Background or Sine-Gaussian/Binary Black Hole.</a:t>
             </a:r>
           </a:p>
           <a:p>
@@ -5026,7 +4938,7 @@
                 <a:ea typeface="Open Sans" charset="0"/>
                 <a:cs typeface="Open Sans" charset="0"/>
               </a:rPr>
-              <a:t>Basic structure of our CNN.</a:t>
+              <a:t>Basic structure of our convolutional neural network (CNN).</a:t>
             </a:r>
           </a:p>
         </p:txBody>
@@ -5118,7 +5030,7 @@
         <p:spPr>
           <a:xfrm>
             <a:off x="457200" y="18470880"/>
-            <a:ext cx="6400800" cy="8402300"/>
+            <a:ext cx="6400800" cy="8321040"/>
           </a:xfrm>
           <a:prstGeom prst="rect">
             <a:avLst/>
@@ -5155,29 +5067,7 @@
                 <a:ea typeface="Open Sans" panose="020B0606030504020204" pitchFamily="34" charset="0"/>
                 <a:cs typeface="Open Sans" panose="020B0606030504020204" pitchFamily="34" charset="0"/>
               </a:rPr>
-              <a:t>Implementing a binary classifier using </a:t>
-            </a:r>
-            <a:r>
-              <a:rPr lang="en-US" sz="2000" dirty="0" err="1">
-                <a:solidFill>
-                  <a:srgbClr val="000000"/>
-                </a:solidFill>
-                <a:latin typeface="Open Sans" panose="020B0606030504020204" pitchFamily="34" charset="0"/>
-                <a:ea typeface="Open Sans" panose="020B0606030504020204" pitchFamily="34" charset="0"/>
-                <a:cs typeface="Open Sans" panose="020B0606030504020204" pitchFamily="34" charset="0"/>
-              </a:rPr>
-              <a:t>PyTorch</a:t>
-            </a:r>
-            <a:r>
-              <a:rPr lang="en-US" sz="2000" dirty="0">
-                <a:solidFill>
-                  <a:srgbClr val="000000"/>
-                </a:solidFill>
-                <a:latin typeface="Open Sans" panose="020B0606030504020204" pitchFamily="34" charset="0"/>
-                <a:ea typeface="Open Sans" panose="020B0606030504020204" pitchFamily="34" charset="0"/>
-                <a:cs typeface="Open Sans" panose="020B0606030504020204" pitchFamily="34" charset="0"/>
-              </a:rPr>
-              <a:t> for time series data.</a:t>
+              <a:t>Implementing a binary classifier using PyTorch for time series data.</a:t>
             </a:r>
           </a:p>
           <a:p>
@@ -5194,7 +5084,7 @@
                 <a:ea typeface="Open Sans" panose="020B0606030504020204" pitchFamily="34" charset="0"/>
                 <a:cs typeface="Open Sans" panose="020B0606030504020204" pitchFamily="34" charset="0"/>
               </a:rPr>
-              <a:t>Conversion: </a:t>
+              <a:t>Image Conversion: </a:t>
             </a:r>
             <a:r>
               <a:rPr lang="en-US" sz="2000" dirty="0">
@@ -5205,51 +5095,7 @@
                 <a:ea typeface="Open Sans" panose="020B0606030504020204" pitchFamily="34" charset="0"/>
                 <a:cs typeface="Open Sans" panose="020B0606030504020204" pitchFamily="34" charset="0"/>
               </a:rPr>
-              <a:t>Convert time series data to 2D images using </a:t>
-            </a:r>
-            <a:r>
-              <a:rPr lang="en-US" sz="2000" dirty="0" err="1">
-                <a:solidFill>
-                  <a:srgbClr val="000000"/>
-                </a:solidFill>
-                <a:latin typeface="Open Sans" panose="020B0606030504020204" pitchFamily="34" charset="0"/>
-                <a:ea typeface="Open Sans" panose="020B0606030504020204" pitchFamily="34" charset="0"/>
-                <a:cs typeface="Open Sans" panose="020B0606030504020204" pitchFamily="34" charset="0"/>
-              </a:rPr>
-              <a:t>Gramian</a:t>
-            </a:r>
-            <a:r>
-              <a:rPr lang="en-US" sz="2000" dirty="0">
-                <a:solidFill>
-                  <a:srgbClr val="000000"/>
-                </a:solidFill>
-                <a:latin typeface="Open Sans" panose="020B0606030504020204" pitchFamily="34" charset="0"/>
-                <a:ea typeface="Open Sans" panose="020B0606030504020204" pitchFamily="34" charset="0"/>
-                <a:cs typeface="Open Sans" panose="020B0606030504020204" pitchFamily="34" charset="0"/>
-              </a:rPr>
-              <a:t> Angular Summation Fields (GASFs) with </a:t>
-            </a:r>
-            <a:r>
-              <a:rPr lang="en-US" sz="2000" dirty="0" err="1">
-                <a:solidFill>
-                  <a:srgbClr val="000000"/>
-                </a:solidFill>
-                <a:latin typeface="Open Sans" panose="020B0606030504020204" pitchFamily="34" charset="0"/>
-                <a:ea typeface="Open Sans" panose="020B0606030504020204" pitchFamily="34" charset="0"/>
-                <a:cs typeface="Open Sans" panose="020B0606030504020204" pitchFamily="34" charset="0"/>
-              </a:rPr>
-              <a:t>pyts</a:t>
-            </a:r>
-            <a:r>
-              <a:rPr lang="en-US" sz="2000" dirty="0">
-                <a:solidFill>
-                  <a:srgbClr val="000000"/>
-                </a:solidFill>
-                <a:latin typeface="Open Sans" panose="020B0606030504020204" pitchFamily="34" charset="0"/>
-                <a:ea typeface="Open Sans" panose="020B0606030504020204" pitchFamily="34" charset="0"/>
-                <a:cs typeface="Open Sans" panose="020B0606030504020204" pitchFamily="34" charset="0"/>
-              </a:rPr>
-              <a:t> library.</a:t>
+              <a:t>Convert time series data to 2D images using Gramian Angular Summation Fields (GASFs) with the pyts library.</a:t>
             </a:r>
           </a:p>
           <a:p>
@@ -5258,6 +5104,17 @@
               <a:buChar char="•"/>
             </a:pPr>
             <a:r>
+              <a:rPr lang="en-US" sz="2000" b="1" dirty="0">
+                <a:solidFill>
+                  <a:srgbClr val="33006F"/>
+                </a:solidFill>
+                <a:latin typeface="Open Sans" panose="020B0606030504020204" pitchFamily="34" charset="0"/>
+                <a:ea typeface="Open Sans" panose="020B0606030504020204" pitchFamily="34" charset="0"/>
+                <a:cs typeface="Open Sans" panose="020B0606030504020204" pitchFamily="34" charset="0"/>
+              </a:rPr>
+              <a:t>Image size: </a:t>
+            </a:r>
+            <a:r>
               <a:rPr lang="en-US" sz="2000" dirty="0">
                 <a:solidFill>
                   <a:srgbClr val="000000"/>
@@ -5266,7 +5123,7 @@
                 <a:ea typeface="Open Sans" panose="020B0606030504020204" pitchFamily="34" charset="0"/>
                 <a:cs typeface="Open Sans" panose="020B0606030504020204" pitchFamily="34" charset="0"/>
               </a:rPr>
-              <a:t>Image size: GASF images are 28x28 pixels for a balance between performance and accuracy.</a:t>
+              <a:t>GASF images are 28x28 pixels for a balance between performance and accuracy.</a:t>
             </a:r>
           </a:p>
           <a:p>
@@ -5339,7 +5196,7 @@
                 <a:ea typeface="Open Sans" panose="020B0606030504020204" pitchFamily="34" charset="0"/>
                 <a:cs typeface="Open Sans" panose="020B0606030504020204" pitchFamily="34" charset="0"/>
               </a:rPr>
-              <a:t>Two convolution layers with 2 input channels, 16 output channels, kernel size 5, stride length 1, and padding 2; and 16 input channels, 32 output channels, kernel size 5, stride length 1, and padding 2.</a:t>
+              <a:t>Two convolution layers; layer one having 2 input channels, 16 output channels, and layer two having 16 input channels, 32 output channels, both with kernel size of 5, stride of 1, and padding of 2.</a:t>
             </a:r>
           </a:p>
           <a:p>
@@ -5367,7 +5224,7 @@
                 <a:ea typeface="Open Sans" panose="020B0606030504020204" pitchFamily="34" charset="0"/>
                 <a:cs typeface="Open Sans" panose="020B0606030504020204" pitchFamily="34" charset="0"/>
               </a:rPr>
-              <a:t>Applied after each convolution layer with kernel size 2, stride 2, and padding 0.</a:t>
+              <a:t>Applied after each convolution layer with kernel size of 2, stride of 2, and padding of 0.</a:t>
             </a:r>
           </a:p>
           <a:p>
@@ -5464,8 +5321,8 @@
         </p:nvSpPr>
         <p:spPr>
           <a:xfrm>
-            <a:off x="15087600" y="20939760"/>
-            <a:ext cx="6400800" cy="914400"/>
+            <a:off x="15087600" y="20756880"/>
+            <a:ext cx="6400800" cy="1200329"/>
           </a:xfrm>
           <a:prstGeom prst="rect">
             <a:avLst/>
@@ -5498,7 +5355,7 @@
                 <a:ea typeface="Open Sans" charset="0"/>
                 <a:cs typeface="Open Sans" charset="0"/>
               </a:rPr>
-              <a:t>: The CNN’s training loss as a function of iterations.</a:t>
+              <a:t>: The training loss of the CNN plotted against the number of iterations.</a:t>
             </a:r>
           </a:p>
           <a:p>
@@ -5522,7 +5379,7 @@
                 <a:ea typeface="Open Sans" charset="0"/>
                 <a:cs typeface="Open Sans" charset="0"/>
               </a:rPr>
-              <a:t>: The CNN’s validation accuracy as a function of epochs elapsed.</a:t>
+              <a:t>: The validation accuracy of the CNN plotted against the number of elapsed epochs.</a:t>
             </a:r>
           </a:p>
         </p:txBody>
@@ -5655,7 +5512,7 @@
                 <a:ea typeface="Open Sans" panose="020B0606030504020204" pitchFamily="34" charset="0"/>
                 <a:cs typeface="Open Sans" panose="020B0606030504020204" pitchFamily="34" charset="0"/>
               </a:rPr>
-              <a:t>Basic layout of the LIGO interferometer.</a:t>
+              <a:t>Fundamental configuration of the LIGO interferometer.</a:t>
             </a:r>
           </a:p>
         </p:txBody>
@@ -5719,8 +5576,8 @@
         </p:nvSpPr>
         <p:spPr>
           <a:xfrm>
-            <a:off x="7772400" y="31272480"/>
-            <a:ext cx="6400800" cy="914400"/>
+            <a:off x="7589520" y="31272480"/>
+            <a:ext cx="6766560" cy="1200329"/>
           </a:xfrm>
           <a:prstGeom prst="rect">
             <a:avLst/>
@@ -5742,7 +5599,7 @@
                 <a:ea typeface="Open Sans" panose="020B0606030504020204" pitchFamily="34" charset="0"/>
                 <a:cs typeface="Open Sans" panose="020B0606030504020204" pitchFamily="34" charset="0"/>
               </a:rPr>
-              <a:t>Sample of the four signal categories from the time series data and their corresponding GASF images from both the Hanford and Livingston detectors.</a:t>
+              <a:t>An example of the four signal categories derived from the time series data, along with their corresponding GASF images captured by both the Hanford and Livingston detectors.</a:t>
             </a:r>
           </a:p>
         </p:txBody>
@@ -5884,31 +5741,7 @@
                 <a:ea typeface="Open Sans" panose="020B0606030504020204" pitchFamily="34" charset="0"/>
                 <a:cs typeface="Open Sans" panose="020B0606030504020204" pitchFamily="34" charset="0"/>
               </a:rPr>
-              <a:t>[3] D. George, H. Shen, and E. A. </a:t>
-            </a:r>
-            <a:r>
-              <a:rPr lang="en-US" sz="1600" kern="100" dirty="0" err="1">
-                <a:solidFill>
-                  <a:srgbClr val="000000"/>
-                </a:solidFill>
-                <a:effectLst/>
-                <a:latin typeface="Open Sans" panose="020B0606030504020204" pitchFamily="34" charset="0"/>
-                <a:ea typeface="Open Sans" panose="020B0606030504020204" pitchFamily="34" charset="0"/>
-                <a:cs typeface="Open Sans" panose="020B0606030504020204" pitchFamily="34" charset="0"/>
-              </a:rPr>
-              <a:t>Heurta</a:t>
-            </a:r>
-            <a:r>
-              <a:rPr lang="en-US" sz="1600" kern="100" dirty="0">
-                <a:solidFill>
-                  <a:srgbClr val="000000"/>
-                </a:solidFill>
-                <a:effectLst/>
-                <a:latin typeface="Open Sans" panose="020B0606030504020204" pitchFamily="34" charset="0"/>
-                <a:ea typeface="Open Sans" panose="020B0606030504020204" pitchFamily="34" charset="0"/>
-                <a:cs typeface="Open Sans" panose="020B0606030504020204" pitchFamily="34" charset="0"/>
-              </a:rPr>
-              <a:t>. Glitch Classification and Clustering for LIGO with Deep Transfer Learning. </a:t>
+              <a:t>[3] D. George, H. Shen, and E. A. Heurta. Glitch Classification and Clustering for LIGO with Deep Transfer Learning. </a:t>
             </a:r>
             <a:r>
               <a:rPr lang="en-US" sz="1600" i="1" kern="100" dirty="0">
@@ -6110,20 +5943,12 @@
           <a:p>
             <a:pPr algn="ctr"/>
             <a:r>
-              <a:rPr lang="en-US" sz="3000" b="1" dirty="0" err="1">
-                <a:latin typeface="Uni Sans Book" charset="0"/>
-                <a:ea typeface="Uni Sans Book" charset="0"/>
-                <a:cs typeface="Uni Sans Book" charset="0"/>
-              </a:rPr>
-              <a:t>Gramian</a:t>
-            </a:r>
-            <a:r>
               <a:rPr lang="en-US" sz="3000" b="1" dirty="0">
                 <a:latin typeface="Uni Sans Book" charset="0"/>
                 <a:ea typeface="Uni Sans Book" charset="0"/>
                 <a:cs typeface="Uni Sans Book" charset="0"/>
               </a:rPr>
-              <a:t> Angular Summation Fields</a:t>
+              <a:t>Gramian Angular Summation Fields</a:t>
             </a:r>
           </a:p>
         </p:txBody>
@@ -6459,7 +6284,7 @@
         </p:nvGrpSpPr>
         <p:grpSpPr>
           <a:xfrm>
-            <a:off x="15087600" y="27980640"/>
+            <a:off x="15087600" y="28072080"/>
             <a:ext cx="6400800" cy="940896"/>
             <a:chOff x="1631339" y="15477966"/>
             <a:chExt cx="6400800" cy="940896"/>
@@ -7086,108 +6911,6 @@
           </a:prstGeom>
         </p:spPr>
       </p:pic>
-      <p:sp>
-        <p:nvSpPr>
-          <p:cNvPr id="99" name="TextBox 98">
-            <a:extLst>
-              <a:ext uri="{FF2B5EF4-FFF2-40B4-BE49-F238E27FC236}">
-                <a16:creationId xmlns:a16="http://schemas.microsoft.com/office/drawing/2014/main" id="{AE8EC566-8264-A9E4-A26E-ACA3E255CEF9}"/>
-              </a:ext>
-            </a:extLst>
-          </p:cNvPr>
-          <p:cNvSpPr txBox="1"/>
-          <p:nvPr/>
-        </p:nvSpPr>
-        <p:spPr>
-          <a:xfrm>
-            <a:off x="7863840" y="91440"/>
-            <a:ext cx="1600200" cy="365760"/>
-          </a:xfrm>
-          <a:prstGeom prst="rect">
-            <a:avLst/>
-          </a:prstGeom>
-          <a:noFill/>
-        </p:spPr>
-        <p:txBody>
-          <a:bodyPr wrap="square" rtlCol="0">
-            <a:spAutoFit/>
-          </a:bodyPr>
-          <a:lstStyle/>
-          <a:p>
-            <a:pPr algn="ctr"/>
-            <a:r>
-              <a:rPr lang="en-US" sz="2000" dirty="0">
-                <a:solidFill>
-                  <a:srgbClr val="33006F"/>
-                </a:solidFill>
-                <a:latin typeface="Uni Sans Book" panose="00000500000000000000" pitchFamily="50" charset="0"/>
-                <a:ea typeface="Open Sans" panose="020B0606030504020204" pitchFamily="34" charset="0"/>
-                <a:cs typeface="Open Sans" panose="020B0606030504020204" pitchFamily="34" charset="0"/>
-              </a:rPr>
-              <a:t>Hanford</a:t>
-            </a:r>
-            <a:endParaRPr lang="en-US" sz="1800" dirty="0">
-              <a:solidFill>
-                <a:srgbClr val="33006F"/>
-              </a:solidFill>
-              <a:latin typeface="Uni Sans Book" panose="00000500000000000000" pitchFamily="50" charset="0"/>
-              <a:ea typeface="Open Sans" panose="020B0606030504020204" pitchFamily="34" charset="0"/>
-              <a:cs typeface="Open Sans" panose="020B0606030504020204" pitchFamily="34" charset="0"/>
-            </a:endParaRPr>
-          </a:p>
-        </p:txBody>
-      </p:sp>
-      <p:sp>
-        <p:nvSpPr>
-          <p:cNvPr id="100" name="TextBox 99">
-            <a:extLst>
-              <a:ext uri="{FF2B5EF4-FFF2-40B4-BE49-F238E27FC236}">
-                <a16:creationId xmlns:a16="http://schemas.microsoft.com/office/drawing/2014/main" id="{819DDE10-9BBF-67E0-4B60-D7DDE62A0B75}"/>
-              </a:ext>
-            </a:extLst>
-          </p:cNvPr>
-          <p:cNvSpPr txBox="1"/>
-          <p:nvPr/>
-        </p:nvSpPr>
-        <p:spPr>
-          <a:xfrm>
-            <a:off x="9372600" y="91440"/>
-            <a:ext cx="1600200" cy="365760"/>
-          </a:xfrm>
-          <a:prstGeom prst="rect">
-            <a:avLst/>
-          </a:prstGeom>
-          <a:noFill/>
-        </p:spPr>
-        <p:txBody>
-          <a:bodyPr wrap="square" rtlCol="0">
-            <a:spAutoFit/>
-          </a:bodyPr>
-          <a:lstStyle/>
-          <a:p>
-            <a:pPr algn="ctr"/>
-            <a:r>
-              <a:rPr lang="en-US" sz="2000" dirty="0">
-                <a:solidFill>
-                  <a:srgbClr val="33006F"/>
-                </a:solidFill>
-                <a:latin typeface="Uni Sans Book" panose="00000500000000000000" pitchFamily="50" charset="0"/>
-                <a:ea typeface="Open Sans" panose="020B0606030504020204" pitchFamily="34" charset="0"/>
-                <a:cs typeface="Open Sans" panose="020B0606030504020204" pitchFamily="34" charset="0"/>
-              </a:rPr>
-              <a:t>Livingston</a:t>
-            </a:r>
-            <a:endParaRPr lang="en-US" sz="1600" dirty="0">
-              <a:solidFill>
-                <a:srgbClr val="33006F"/>
-              </a:solidFill>
-              <a:latin typeface="Uni Sans Book" panose="00000500000000000000" pitchFamily="50" charset="0"/>
-              <a:ea typeface="Open Sans" panose="020B0606030504020204" pitchFamily="34" charset="0"/>
-              <a:cs typeface="Open Sans" panose="020B0606030504020204" pitchFamily="34" charset="0"/>
-            </a:endParaRPr>
-          </a:p>
-        </p:txBody>
-      </p:sp>
       <p:sp>
         <p:nvSpPr>
           <p:cNvPr id="115" name="TextBox 114">

</xml_diff>